<commit_message>
add activiti diagrams to slide
</commit_message>
<xml_diff>
--- a/BTL.pptx
+++ b/BTL.pptx
@@ -781,27 +781,6 @@
 <file path=ppt/slideLayouts/slideLayout1.xml><?xml version="1.0" encoding="utf-8"?>
 <p:sldLayout xmlns:a="http://schemas.openxmlformats.org/drawingml/2006/main" xmlns:r="http://schemas.openxmlformats.org/officeDocument/2006/relationships" xmlns:p="http://schemas.openxmlformats.org/presentationml/2006/main" preserve="1" userDrawn="1">
   <p:cSld name="Cover Slide layout">
-    <p:bg>
-      <p:bgPr>
-        <a:gradFill flip="none" rotWithShape="1">
-          <a:gsLst>
-            <a:gs pos="0">
-              <a:schemeClr val="bg1"/>
-            </a:gs>
-            <a:gs pos="100000">
-              <a:schemeClr val="bg1">
-                <a:lumMod val="95000"/>
-              </a:schemeClr>
-            </a:gs>
-          </a:gsLst>
-          <a:path path="circle">
-            <a:fillToRect l="50000" t="50000" r="50000" b="50000"/>
-          </a:path>
-          <a:tileRect/>
-        </a:gradFill>
-        <a:effectLst/>
-      </p:bgPr>
-    </p:bg>
     <p:spTree>
       <p:nvGrpSpPr>
         <p:cNvPr id="1" name=""/>
@@ -975,20 +954,6 @@
 <file path=ppt/slideLayouts/slideLayout10.xml><?xml version="1.0" encoding="utf-8"?>
 <p:sldLayout xmlns:a="http://schemas.openxmlformats.org/drawingml/2006/main" xmlns:r="http://schemas.openxmlformats.org/officeDocument/2006/relationships" xmlns:p="http://schemas.openxmlformats.org/presentationml/2006/main" preserve="1" userDrawn="1">
   <p:cSld name="7_Agenda Layout">
-    <p:bg>
-      <p:bgPr>
-        <a:blipFill dpi="0" rotWithShape="1">
-          <a:blip r:embed="rId2">
-            <a:lum/>
-          </a:blip>
-          <a:srcRect/>
-          <a:stretch>
-            <a:fillRect/>
-          </a:stretch>
-        </a:blipFill>
-        <a:effectLst/>
-      </p:bgPr>
-    </p:bg>
     <p:spTree>
       <p:nvGrpSpPr>
         <p:cNvPr id="1" name=""/>
@@ -1105,7 +1070,7 @@
           <p:nvPr userDrawn="1"/>
         </p:nvPicPr>
         <p:blipFill>
-          <a:blip r:embed="rId3" cstate="print">
+          <a:blip r:embed="rId2" cstate="print">
             <a:extLst>
               <a:ext uri="{28A0092B-C50C-407E-A947-70E740481C1C}">
                 <a14:useLocalDpi xmlns:a14="http://schemas.microsoft.com/office/drawing/2010/main" val="0"/>
@@ -1519,20 +1484,6 @@
 <file path=ppt/slideLayouts/slideLayout11.xml><?xml version="1.0" encoding="utf-8"?>
 <p:sldLayout xmlns:a="http://schemas.openxmlformats.org/drawingml/2006/main" xmlns:r="http://schemas.openxmlformats.org/officeDocument/2006/relationships" xmlns:p="http://schemas.openxmlformats.org/presentationml/2006/main" preserve="1" userDrawn="1">
   <p:cSld name="8_Agenda Layout">
-    <p:bg>
-      <p:bgPr>
-        <a:blipFill dpi="0" rotWithShape="1">
-          <a:blip r:embed="rId2">
-            <a:lum/>
-          </a:blip>
-          <a:srcRect/>
-          <a:stretch>
-            <a:fillRect/>
-          </a:stretch>
-        </a:blipFill>
-        <a:effectLst/>
-      </p:bgPr>
-    </p:bg>
     <p:spTree>
       <p:nvGrpSpPr>
         <p:cNvPr id="1" name=""/>
@@ -1649,7 +1600,7 @@
           <p:nvPr userDrawn="1"/>
         </p:nvPicPr>
         <p:blipFill>
-          <a:blip r:embed="rId3">
+          <a:blip r:embed="rId2">
             <a:extLst>
               <a:ext uri="{28A0092B-C50C-407E-A947-70E740481C1C}">
                 <a14:useLocalDpi xmlns:a14="http://schemas.microsoft.com/office/drawing/2010/main" val="0"/>
@@ -2697,16 +2648,6 @@
 <file path=ppt/slideLayouts/slideLayout14.xml><?xml version="1.0" encoding="utf-8"?>
 <p:sldLayout xmlns:a="http://schemas.openxmlformats.org/drawingml/2006/main" xmlns:r="http://schemas.openxmlformats.org/officeDocument/2006/relationships" xmlns:p="http://schemas.openxmlformats.org/presentationml/2006/main" preserve="1" userDrawn="1">
   <p:cSld name="3_Basic Layout">
-    <p:bg>
-      <p:bgPr>
-        <a:solidFill>
-          <a:schemeClr val="bg1">
-            <a:lumMod val="95000"/>
-          </a:schemeClr>
-        </a:solidFill>
-        <a:effectLst/>
-      </p:bgPr>
-    </p:bg>
     <p:spTree>
       <p:nvGrpSpPr>
         <p:cNvPr id="1" name=""/>
@@ -2953,6 +2894,310 @@
 
 <file path=ppt/slideLayouts/slideLayout15.xml><?xml version="1.0" encoding="utf-8"?>
 <p:sldLayout xmlns:a="http://schemas.openxmlformats.org/drawingml/2006/main" xmlns:r="http://schemas.openxmlformats.org/officeDocument/2006/relationships" xmlns:p="http://schemas.openxmlformats.org/presentationml/2006/main" preserve="1" userDrawn="1">
+  <p:cSld name="4_Higher - but fail">
+    <p:spTree>
+      <p:nvGrpSpPr>
+        <p:cNvPr id="1" name=""/>
+        <p:cNvGrpSpPr/>
+        <p:nvPr/>
+      </p:nvGrpSpPr>
+      <p:grpSpPr>
+        <a:xfrm>
+          <a:off x="0" y="0"/>
+          <a:ext cx="0" cy="0"/>
+          <a:chOff x="0" y="0"/>
+          <a:chExt cx="0" cy="0"/>
+        </a:xfrm>
+      </p:grpSpPr>
+      <p:sp>
+        <p:nvSpPr>
+          <p:cNvPr id="10" name="Text Placeholder 9"/>
+          <p:cNvSpPr>
+            <a:spLocks noGrp="1"/>
+          </p:cNvSpPr>
+          <p:nvPr>
+            <p:ph type="body" sz="quarter" idx="10" hasCustomPrompt="1"/>
+          </p:nvPr>
+        </p:nvSpPr>
+        <p:spPr>
+          <a:xfrm>
+            <a:off x="2168528" y="5433134"/>
+            <a:ext cx="2924582" cy="768085"/>
+          </a:xfrm>
+          <a:prstGeom prst="rect">
+            <a:avLst/>
+          </a:prstGeom>
+        </p:spPr>
+        <p:txBody>
+          <a:bodyPr anchor="ctr"/>
+          <a:lstStyle>
+            <a:lvl1pPr marL="0" indent="0" algn="l">
+              <a:buNone/>
+              <a:defRPr sz="5333" b="1" baseline="0">
+                <a:solidFill>
+                  <a:srgbClr val="FF0000"/>
+                </a:solidFill>
+                <a:latin typeface="+mj-lt"/>
+                <a:cs typeface="Arial" pitchFamily="34" charset="0"/>
+              </a:defRPr>
+            </a:lvl1pPr>
+          </a:lstStyle>
+          <a:p>
+            <a:pPr lvl="0"/>
+            <a:r>
+              <a:rPr lang="en-US" altLang="ko-KR" dirty="0" err="1"/>
+              <a:t>Biểu</a:t>
+            </a:r>
+            <a:r>
+              <a:rPr lang="en-US" altLang="ko-KR" dirty="0"/>
+              <a:t> </a:t>
+            </a:r>
+            <a:r>
+              <a:rPr lang="en-US" altLang="ko-KR" dirty="0" err="1"/>
+              <a:t>đồ</a:t>
+            </a:r>
+            <a:endParaRPr lang="en-US" altLang="ko-KR" dirty="0"/>
+          </a:p>
+        </p:txBody>
+      </p:sp>
+      <p:pic>
+        <p:nvPicPr>
+          <p:cNvPr id="4" name="Picture 2" descr="E:\002-KIMS BUSINESS\007-02-Fullslidesppt-Contents\20161216\Stethoscope as symbol of medicine PowerPoint Templates\main-item-01.png"/>
+          <p:cNvPicPr>
+            <a:picLocks noChangeAspect="1" noChangeArrowheads="1"/>
+          </p:cNvPicPr>
+          <p:nvPr userDrawn="1"/>
+        </p:nvPicPr>
+        <p:blipFill>
+          <a:blip r:embed="rId2" cstate="print">
+            <a:extLst>
+              <a:ext uri="{28A0092B-C50C-407E-A947-70E740481C1C}">
+                <a14:useLocalDpi xmlns:a14="http://schemas.microsoft.com/office/drawing/2010/main" val="0"/>
+              </a:ext>
+            </a:extLst>
+          </a:blip>
+          <a:srcRect/>
+          <a:stretch>
+            <a:fillRect/>
+          </a:stretch>
+        </p:blipFill>
+        <p:spPr bwMode="auto">
+          <a:xfrm>
+            <a:off x="922037" y="5433134"/>
+            <a:ext cx="1034892" cy="768085"/>
+          </a:xfrm>
+          <a:prstGeom prst="rect">
+            <a:avLst/>
+          </a:prstGeom>
+          <a:noFill/>
+          <a:extLst>
+            <a:ext uri="{909E8E84-426E-40DD-AFC4-6F175D3DCCD1}">
+              <a14:hiddenFill xmlns:a14="http://schemas.microsoft.com/office/drawing/2010/main">
+                <a:solidFill>
+                  <a:srgbClr val="FFFFFF"/>
+                </a:solidFill>
+              </a14:hiddenFill>
+            </a:ext>
+          </a:extLst>
+        </p:spPr>
+      </p:pic>
+      <p:sp>
+        <p:nvSpPr>
+          <p:cNvPr id="2" name="Rectangle 1"/>
+          <p:cNvSpPr/>
+          <p:nvPr userDrawn="1"/>
+        </p:nvSpPr>
+        <p:spPr>
+          <a:xfrm>
+            <a:off x="719403" y="5325035"/>
+            <a:ext cx="10753195" cy="984285"/>
+          </a:xfrm>
+          <a:prstGeom prst="rect">
+            <a:avLst/>
+          </a:prstGeom>
+          <a:noFill/>
+          <a:ln w="19050">
+            <a:solidFill>
+              <a:schemeClr val="tx1">
+                <a:lumMod val="75000"/>
+                <a:lumOff val="25000"/>
+              </a:schemeClr>
+            </a:solidFill>
+          </a:ln>
+        </p:spPr>
+        <p:style>
+          <a:lnRef idx="2">
+            <a:schemeClr val="accent1">
+              <a:shade val="50000"/>
+            </a:schemeClr>
+          </a:lnRef>
+          <a:fillRef idx="1">
+            <a:schemeClr val="accent1"/>
+          </a:fillRef>
+          <a:effectRef idx="0">
+            <a:schemeClr val="accent1"/>
+          </a:effectRef>
+          <a:fontRef idx="minor">
+            <a:schemeClr val="lt1"/>
+          </a:fontRef>
+        </p:style>
+        <p:txBody>
+          <a:bodyPr rtlCol="0" anchor="ctr"/>
+          <a:lstStyle/>
+          <a:p>
+            <a:pPr algn="ctr"/>
+            <a:endParaRPr lang="ko-KR" altLang="en-US" sz="2400"/>
+          </a:p>
+        </p:txBody>
+      </p:sp>
+      <p:sp>
+        <p:nvSpPr>
+          <p:cNvPr id="8" name="Picture Placeholder 2"/>
+          <p:cNvSpPr>
+            <a:spLocks noGrp="1" noChangeAspect="1"/>
+          </p:cNvSpPr>
+          <p:nvPr>
+            <p:ph type="pic" idx="1" hasCustomPrompt="1"/>
+          </p:nvPr>
+        </p:nvSpPr>
+        <p:spPr>
+          <a:xfrm>
+            <a:off x="719403" y="0"/>
+            <a:ext cx="10753195" cy="5216934"/>
+          </a:xfrm>
+          <a:prstGeom prst="rect">
+            <a:avLst/>
+          </a:prstGeom>
+          <a:solidFill>
+            <a:schemeClr val="bg1">
+              <a:lumMod val="95000"/>
+            </a:schemeClr>
+          </a:solidFill>
+        </p:spPr>
+        <p:txBody>
+          <a:bodyPr anchor="ctr"/>
+          <a:lstStyle>
+            <a:lvl1pPr marL="0" indent="0" algn="ctr">
+              <a:buNone/>
+              <a:defRPr sz="1600" baseline="0">
+                <a:solidFill>
+                  <a:schemeClr val="tx1">
+                    <a:lumMod val="75000"/>
+                    <a:lumOff val="25000"/>
+                  </a:schemeClr>
+                </a:solidFill>
+                <a:latin typeface="+mn-lt"/>
+                <a:cs typeface="Arial" pitchFamily="34" charset="0"/>
+              </a:defRPr>
+            </a:lvl1pPr>
+            <a:lvl2pPr marL="609585" indent="0">
+              <a:buNone/>
+              <a:defRPr sz="3733"/>
+            </a:lvl2pPr>
+            <a:lvl3pPr marL="1219170" indent="0">
+              <a:buNone/>
+              <a:defRPr sz="3200"/>
+            </a:lvl3pPr>
+            <a:lvl4pPr marL="1828754" indent="0">
+              <a:buNone/>
+              <a:defRPr sz="2667"/>
+            </a:lvl4pPr>
+            <a:lvl5pPr marL="2438339" indent="0">
+              <a:buNone/>
+              <a:defRPr sz="2667"/>
+            </a:lvl5pPr>
+            <a:lvl6pPr marL="3047924" indent="0">
+              <a:buNone/>
+              <a:defRPr sz="2667"/>
+            </a:lvl6pPr>
+            <a:lvl7pPr marL="3657509" indent="0">
+              <a:buNone/>
+              <a:defRPr sz="2667"/>
+            </a:lvl7pPr>
+            <a:lvl8pPr marL="4267093" indent="0">
+              <a:buNone/>
+              <a:defRPr sz="2667"/>
+            </a:lvl8pPr>
+            <a:lvl9pPr marL="4876678" indent="0">
+              <a:buNone/>
+              <a:defRPr sz="2667"/>
+            </a:lvl9pPr>
+          </a:lstStyle>
+          <a:p>
+            <a:r>
+              <a:rPr lang="en-US" altLang="ko-KR" dirty="0"/>
+              <a:t>Your Picture Here</a:t>
+            </a:r>
+            <a:endParaRPr lang="ko-KR" altLang="en-US" dirty="0"/>
+          </a:p>
+        </p:txBody>
+      </p:sp>
+      <p:sp>
+        <p:nvSpPr>
+          <p:cNvPr id="6" name="Text Placeholder 9">
+            <a:extLst>
+              <a:ext uri="{FF2B5EF4-FFF2-40B4-BE49-F238E27FC236}">
+                <a16:creationId xmlns:a16="http://schemas.microsoft.com/office/drawing/2014/main" id="{265961D5-2312-4239-A552-35C02432BEE6}"/>
+              </a:ext>
+            </a:extLst>
+          </p:cNvPr>
+          <p:cNvSpPr>
+            <a:spLocks noGrp="1"/>
+          </p:cNvSpPr>
+          <p:nvPr>
+            <p:ph type="body" sz="quarter" idx="11" hasCustomPrompt="1"/>
+          </p:nvPr>
+        </p:nvSpPr>
+        <p:spPr>
+          <a:xfrm>
+            <a:off x="5208494" y="5434178"/>
+            <a:ext cx="6061469" cy="768085"/>
+          </a:xfrm>
+          <a:prstGeom prst="rect">
+            <a:avLst/>
+          </a:prstGeom>
+        </p:spPr>
+        <p:txBody>
+          <a:bodyPr anchor="ctr"/>
+          <a:lstStyle>
+            <a:lvl1pPr marL="0" indent="0" algn="l">
+              <a:buNone/>
+              <a:defRPr sz="2800" b="0" baseline="0">
+                <a:solidFill>
+                  <a:schemeClr val="tx1">
+                    <a:lumMod val="75000"/>
+                    <a:lumOff val="25000"/>
+                  </a:schemeClr>
+                </a:solidFill>
+                <a:latin typeface="+mj-lt"/>
+                <a:cs typeface="Arial" pitchFamily="34" charset="0"/>
+              </a:defRPr>
+            </a:lvl1pPr>
+          </a:lstStyle>
+          <a:p>
+            <a:pPr lvl="0"/>
+            <a:r>
+              <a:rPr lang="en-US" altLang="ko-KR" dirty="0"/>
+              <a:t>BASIC</a:t>
+            </a:r>
+          </a:p>
+        </p:txBody>
+      </p:sp>
+    </p:spTree>
+    <p:extLst>
+      <p:ext uri="{BB962C8B-B14F-4D97-AF65-F5344CB8AC3E}">
+        <p14:creationId xmlns:p14="http://schemas.microsoft.com/office/powerpoint/2010/main" val="654075775"/>
+      </p:ext>
+    </p:extLst>
+  </p:cSld>
+  <p:clrMapOvr>
+    <a:masterClrMapping/>
+  </p:clrMapOvr>
+</p:sldLayout>
+</file>
+
+<file path=ppt/slideLayouts/slideLayout16.xml><?xml version="1.0" encoding="utf-8"?>
+<p:sldLayout xmlns:a="http://schemas.openxmlformats.org/drawingml/2006/main" xmlns:r="http://schemas.openxmlformats.org/officeDocument/2006/relationships" xmlns:p="http://schemas.openxmlformats.org/presentationml/2006/main" preserve="1" userDrawn="1">
   <p:cSld name="5_Images and Contents Layout">
     <p:spTree>
       <p:nvGrpSpPr>
@@ -3063,7 +3308,7 @@
 </p:sldLayout>
 </file>
 
-<file path=ppt/slideLayouts/slideLayout16.xml><?xml version="1.0" encoding="utf-8"?>
+<file path=ppt/slideLayouts/slideLayout17.xml><?xml version="1.0" encoding="utf-8"?>
 <p:sldLayout xmlns:a="http://schemas.openxmlformats.org/drawingml/2006/main" xmlns:r="http://schemas.openxmlformats.org/officeDocument/2006/relationships" xmlns:p="http://schemas.openxmlformats.org/presentationml/2006/main" preserve="1" userDrawn="1">
   <p:cSld name="6_Images and Contents Layout">
     <p:spTree>
@@ -3467,7 +3712,7 @@
 </p:sldLayout>
 </file>
 
-<file path=ppt/slideLayouts/slideLayout17.xml><?xml version="1.0" encoding="utf-8"?>
+<file path=ppt/slideLayouts/slideLayout18.xml><?xml version="1.0" encoding="utf-8"?>
 <p:sldLayout xmlns:a="http://schemas.openxmlformats.org/drawingml/2006/main" xmlns:r="http://schemas.openxmlformats.org/officeDocument/2006/relationships" xmlns:p="http://schemas.openxmlformats.org/presentationml/2006/main" preserve="1" userDrawn="1">
   <p:cSld name="7_Images and Contents Layout">
     <p:spTree>
@@ -3660,7 +3905,7 @@
 </p:sldLayout>
 </file>
 
-<file path=ppt/slideLayouts/slideLayout18.xml><?xml version="1.0" encoding="utf-8"?>
+<file path=ppt/slideLayouts/slideLayout19.xml><?xml version="1.0" encoding="utf-8"?>
 <p:sldLayout xmlns:a="http://schemas.openxmlformats.org/drawingml/2006/main" xmlns:r="http://schemas.openxmlformats.org/officeDocument/2006/relationships" xmlns:p="http://schemas.openxmlformats.org/presentationml/2006/main" preserve="1" userDrawn="1">
   <p:cSld name="8_Images and Contents Layout">
     <p:spTree>
@@ -3886,94 +4131,6 @@
     <p:extLst>
       <p:ext uri="{BB962C8B-B14F-4D97-AF65-F5344CB8AC3E}">
         <p14:creationId xmlns:p14="http://schemas.microsoft.com/office/powerpoint/2010/main" val="568430579"/>
-      </p:ext>
-    </p:extLst>
-  </p:cSld>
-  <p:clrMapOvr>
-    <a:masterClrMapping/>
-  </p:clrMapOvr>
-</p:sldLayout>
-</file>
-
-<file path=ppt/slideLayouts/slideLayout19.xml><?xml version="1.0" encoding="utf-8"?>
-<p:sldLayout xmlns:a="http://schemas.openxmlformats.org/drawingml/2006/main" xmlns:r="http://schemas.openxmlformats.org/officeDocument/2006/relationships" xmlns:p="http://schemas.openxmlformats.org/presentationml/2006/main" preserve="1" userDrawn="1">
-  <p:cSld name="shapes sets layout">
-    <p:bg>
-      <p:bgPr>
-        <a:blipFill dpi="0" rotWithShape="1">
-          <a:blip r:embed="rId2">
-            <a:lum/>
-          </a:blip>
-          <a:srcRect/>
-          <a:stretch>
-            <a:fillRect/>
-          </a:stretch>
-        </a:blipFill>
-        <a:effectLst/>
-      </p:bgPr>
-    </p:bg>
-    <p:spTree>
-      <p:nvGrpSpPr>
-        <p:cNvPr id="1" name=""/>
-        <p:cNvGrpSpPr/>
-        <p:nvPr/>
-      </p:nvGrpSpPr>
-      <p:grpSpPr>
-        <a:xfrm>
-          <a:off x="0" y="0"/>
-          <a:ext cx="0" cy="0"/>
-          <a:chOff x="0" y="0"/>
-          <a:chExt cx="0" cy="0"/>
-        </a:xfrm>
-      </p:grpSpPr>
-      <p:sp>
-        <p:nvSpPr>
-          <p:cNvPr id="2" name="Text Placeholder 9"/>
-          <p:cNvSpPr>
-            <a:spLocks noGrp="1"/>
-          </p:cNvSpPr>
-          <p:nvPr>
-            <p:ph type="body" sz="quarter" idx="10" hasCustomPrompt="1"/>
-          </p:nvPr>
-        </p:nvSpPr>
-        <p:spPr>
-          <a:xfrm>
-            <a:off x="323528" y="123479"/>
-            <a:ext cx="11573197" cy="724247"/>
-          </a:xfrm>
-          <a:prstGeom prst="rect">
-            <a:avLst/>
-          </a:prstGeom>
-        </p:spPr>
-        <p:txBody>
-          <a:bodyPr anchor="ctr"/>
-          <a:lstStyle>
-            <a:lvl1pPr marL="0" indent="0" algn="ctr">
-              <a:buNone/>
-              <a:defRPr sz="5400" b="0" baseline="0">
-                <a:solidFill>
-                  <a:schemeClr val="tx1">
-                    <a:lumMod val="85000"/>
-                    <a:lumOff val="15000"/>
-                  </a:schemeClr>
-                </a:solidFill>
-                <a:latin typeface="+mj-lt"/>
-                <a:cs typeface="Arial" pitchFamily="34" charset="0"/>
-              </a:defRPr>
-            </a:lvl1pPr>
-          </a:lstStyle>
-          <a:p>
-            <a:r>
-              <a:rPr lang="en-US" altLang="ko-KR" dirty="0"/>
-              <a:t>Fully Editable Shapes</a:t>
-            </a:r>
-          </a:p>
-        </p:txBody>
-      </p:sp>
-    </p:spTree>
-    <p:extLst>
-      <p:ext uri="{BB962C8B-B14F-4D97-AF65-F5344CB8AC3E}">
-        <p14:creationId xmlns:p14="http://schemas.microsoft.com/office/powerpoint/2010/main" val="1368731419"/>
       </p:ext>
     </p:extLst>
   </p:cSld>
@@ -4193,6 +4350,80 @@
 </file>
 
 <file path=ppt/slideLayouts/slideLayout20.xml><?xml version="1.0" encoding="utf-8"?>
+<p:sldLayout xmlns:a="http://schemas.openxmlformats.org/drawingml/2006/main" xmlns:r="http://schemas.openxmlformats.org/officeDocument/2006/relationships" xmlns:p="http://schemas.openxmlformats.org/presentationml/2006/main" preserve="1" userDrawn="1">
+  <p:cSld name="shapes sets layout">
+    <p:spTree>
+      <p:nvGrpSpPr>
+        <p:cNvPr id="1" name=""/>
+        <p:cNvGrpSpPr/>
+        <p:nvPr/>
+      </p:nvGrpSpPr>
+      <p:grpSpPr>
+        <a:xfrm>
+          <a:off x="0" y="0"/>
+          <a:ext cx="0" cy="0"/>
+          <a:chOff x="0" y="0"/>
+          <a:chExt cx="0" cy="0"/>
+        </a:xfrm>
+      </p:grpSpPr>
+      <p:sp>
+        <p:nvSpPr>
+          <p:cNvPr id="2" name="Text Placeholder 9"/>
+          <p:cNvSpPr>
+            <a:spLocks noGrp="1"/>
+          </p:cNvSpPr>
+          <p:nvPr>
+            <p:ph type="body" sz="quarter" idx="10" hasCustomPrompt="1"/>
+          </p:nvPr>
+        </p:nvSpPr>
+        <p:spPr>
+          <a:xfrm>
+            <a:off x="323528" y="123479"/>
+            <a:ext cx="11573197" cy="724247"/>
+          </a:xfrm>
+          <a:prstGeom prst="rect">
+            <a:avLst/>
+          </a:prstGeom>
+        </p:spPr>
+        <p:txBody>
+          <a:bodyPr anchor="ctr"/>
+          <a:lstStyle>
+            <a:lvl1pPr marL="0" indent="0" algn="ctr">
+              <a:buNone/>
+              <a:defRPr sz="5400" b="0" baseline="0">
+                <a:solidFill>
+                  <a:schemeClr val="tx1">
+                    <a:lumMod val="85000"/>
+                    <a:lumOff val="15000"/>
+                  </a:schemeClr>
+                </a:solidFill>
+                <a:latin typeface="+mj-lt"/>
+                <a:cs typeface="Arial" pitchFamily="34" charset="0"/>
+              </a:defRPr>
+            </a:lvl1pPr>
+          </a:lstStyle>
+          <a:p>
+            <a:r>
+              <a:rPr lang="en-US" altLang="ko-KR" dirty="0"/>
+              <a:t>Fully Editable Shapes</a:t>
+            </a:r>
+          </a:p>
+        </p:txBody>
+      </p:sp>
+    </p:spTree>
+    <p:extLst>
+      <p:ext uri="{BB962C8B-B14F-4D97-AF65-F5344CB8AC3E}">
+        <p14:creationId xmlns:p14="http://schemas.microsoft.com/office/powerpoint/2010/main" val="1368731419"/>
+      </p:ext>
+    </p:extLst>
+  </p:cSld>
+  <p:clrMapOvr>
+    <a:masterClrMapping/>
+  </p:clrMapOvr>
+</p:sldLayout>
+</file>
+
+<file path=ppt/slideLayouts/slideLayout21.xml><?xml version="1.0" encoding="utf-8"?>
 <p:sldLayout xmlns:a="http://schemas.openxmlformats.org/drawingml/2006/main" xmlns:r="http://schemas.openxmlformats.org/officeDocument/2006/relationships" xmlns:p="http://schemas.openxmlformats.org/presentationml/2006/main" preserve="1" userDrawn="1">
   <p:cSld name="icon sets layout">
     <p:spTree>
@@ -4421,14 +4652,6 @@
 <file path=ppt/slideLayouts/slideLayout3.xml><?xml version="1.0" encoding="utf-8"?>
 <p:sldLayout xmlns:a="http://schemas.openxmlformats.org/drawingml/2006/main" xmlns:r="http://schemas.openxmlformats.org/officeDocument/2006/relationships" xmlns:p="http://schemas.openxmlformats.org/presentationml/2006/main" preserve="1" userDrawn="1">
   <p:cSld name="Agenda Layout">
-    <p:bg>
-      <p:bgPr>
-        <a:solidFill>
-          <a:schemeClr val="bg1"/>
-        </a:solidFill>
-        <a:effectLst/>
-      </p:bgPr>
-    </p:bg>
     <p:spTree>
       <p:nvGrpSpPr>
         <p:cNvPr id="1" name=""/>
@@ -4459,20 +4682,6 @@
 <file path=ppt/slideLayouts/slideLayout4.xml><?xml version="1.0" encoding="utf-8"?>
 <p:sldLayout xmlns:a="http://schemas.openxmlformats.org/drawingml/2006/main" xmlns:r="http://schemas.openxmlformats.org/officeDocument/2006/relationships" xmlns:p="http://schemas.openxmlformats.org/presentationml/2006/main" preserve="1" userDrawn="1">
   <p:cSld name="1_Agenda Layout">
-    <p:bg>
-      <p:bgPr>
-        <a:blipFill dpi="0" rotWithShape="1">
-          <a:blip r:embed="rId2">
-            <a:lum/>
-          </a:blip>
-          <a:srcRect/>
-          <a:stretch>
-            <a:fillRect/>
-          </a:stretch>
-        </a:blipFill>
-        <a:effectLst/>
-      </p:bgPr>
-    </p:bg>
     <p:spTree>
       <p:nvGrpSpPr>
         <p:cNvPr id="1" name=""/>
@@ -4583,7 +4792,7 @@
           <p:nvPr userDrawn="1"/>
         </p:nvPicPr>
         <p:blipFill>
-          <a:blip r:embed="rId3" cstate="print">
+          <a:blip r:embed="rId2" cstate="print">
             <a:extLst>
               <a:ext uri="{28A0092B-C50C-407E-A947-70E740481C1C}">
                 <a14:useLocalDpi xmlns:a14="http://schemas.microsoft.com/office/drawing/2010/main" val="0"/>
@@ -4669,20 +4878,6 @@
 <file path=ppt/slideLayouts/slideLayout5.xml><?xml version="1.0" encoding="utf-8"?>
 <p:sldLayout xmlns:a="http://schemas.openxmlformats.org/drawingml/2006/main" xmlns:r="http://schemas.openxmlformats.org/officeDocument/2006/relationships" xmlns:p="http://schemas.openxmlformats.org/presentationml/2006/main" preserve="1" userDrawn="1">
   <p:cSld name="5_Agenda Layout">
-    <p:bg>
-      <p:bgPr>
-        <a:blipFill dpi="0" rotWithShape="1">
-          <a:blip r:embed="rId2">
-            <a:lum/>
-          </a:blip>
-          <a:srcRect/>
-          <a:stretch>
-            <a:fillRect/>
-          </a:stretch>
-        </a:blipFill>
-        <a:effectLst/>
-      </p:bgPr>
-    </p:bg>
     <p:spTree>
       <p:nvGrpSpPr>
         <p:cNvPr id="1" name=""/>
@@ -4860,20 +5055,6 @@
 <file path=ppt/slideLayouts/slideLayout6.xml><?xml version="1.0" encoding="utf-8"?>
 <p:sldLayout xmlns:a="http://schemas.openxmlformats.org/drawingml/2006/main" xmlns:r="http://schemas.openxmlformats.org/officeDocument/2006/relationships" xmlns:p="http://schemas.openxmlformats.org/presentationml/2006/main" preserve="1" userDrawn="1">
   <p:cSld name="6_Agenda Layout">
-    <p:bg>
-      <p:bgPr>
-        <a:blipFill dpi="0" rotWithShape="1">
-          <a:blip r:embed="rId2">
-            <a:lum/>
-          </a:blip>
-          <a:srcRect/>
-          <a:stretch>
-            <a:fillRect/>
-          </a:stretch>
-        </a:blipFill>
-        <a:effectLst/>
-      </p:bgPr>
-    </p:bg>
     <p:spTree>
       <p:nvGrpSpPr>
         <p:cNvPr id="1" name=""/>
@@ -4997,14 +5178,6 @@
 <file path=ppt/slideLayouts/slideLayout7.xml><?xml version="1.0" encoding="utf-8"?>
 <p:sldLayout xmlns:a="http://schemas.openxmlformats.org/drawingml/2006/main" xmlns:r="http://schemas.openxmlformats.org/officeDocument/2006/relationships" xmlns:p="http://schemas.openxmlformats.org/presentationml/2006/main" preserve="1" userDrawn="1">
   <p:cSld name="2_Basic Layout">
-    <p:bg>
-      <p:bgPr>
-        <a:solidFill>
-          <a:schemeClr val="bg1"/>
-        </a:solidFill>
-        <a:effectLst/>
-      </p:bgPr>
-    </p:bg>
     <p:spTree>
       <p:nvGrpSpPr>
         <p:cNvPr id="1" name=""/>
@@ -5317,20 +5490,6 @@
 <file path=ppt/slideLayouts/slideLayout9.xml><?xml version="1.0" encoding="utf-8"?>
 <p:sldLayout xmlns:a="http://schemas.openxmlformats.org/drawingml/2006/main" xmlns:r="http://schemas.openxmlformats.org/officeDocument/2006/relationships" xmlns:p="http://schemas.openxmlformats.org/presentationml/2006/main" preserve="1" userDrawn="1">
   <p:cSld name="3_Agenda Layout">
-    <p:bg>
-      <p:bgPr>
-        <a:blipFill dpi="0" rotWithShape="1">
-          <a:blip r:embed="rId2">
-            <a:lum/>
-          </a:blip>
-          <a:srcRect/>
-          <a:stretch>
-            <a:fillRect/>
-          </a:stretch>
-        </a:blipFill>
-        <a:effectLst/>
-      </p:bgPr>
-    </p:bg>
     <p:spTree>
       <p:nvGrpSpPr>
         <p:cNvPr id="1" name=""/>
@@ -5447,7 +5606,7 @@
           <p:nvPr userDrawn="1"/>
         </p:nvPicPr>
         <p:blipFill>
-          <a:blip r:embed="rId3" cstate="print">
+          <a:blip r:embed="rId2" cstate="print">
             <a:extLst>
               <a:ext uri="{28A0092B-C50C-407E-A947-70E740481C1C}">
                 <a14:useLocalDpi xmlns:a14="http://schemas.microsoft.com/office/drawing/2010/main" val="0"/>
@@ -5534,9 +5693,14 @@
 <p:sldMaster xmlns:a="http://schemas.openxmlformats.org/drawingml/2006/main" xmlns:r="http://schemas.openxmlformats.org/officeDocument/2006/relationships" xmlns:p="http://schemas.openxmlformats.org/presentationml/2006/main">
   <p:cSld>
     <p:bg>
-      <p:bgRef idx="1001">
-        <a:schemeClr val="bg1"/>
-      </p:bgRef>
+      <p:bgPr>
+        <a:solidFill>
+          <a:schemeClr val="bg1">
+            <a:lumMod val="95000"/>
+          </a:schemeClr>
+        </a:solidFill>
+        <a:effectLst/>
+      </p:bgPr>
     </p:bg>
     <p:spTree>
       <p:nvGrpSpPr>
@@ -5821,9 +5985,14 @@
 <p:sldMaster xmlns:a="http://schemas.openxmlformats.org/drawingml/2006/main" xmlns:r="http://schemas.openxmlformats.org/officeDocument/2006/relationships" xmlns:p="http://schemas.openxmlformats.org/presentationml/2006/main" preserve="1">
   <p:cSld>
     <p:bg>
-      <p:bgRef idx="1001">
-        <a:schemeClr val="bg1"/>
-      </p:bgRef>
+      <p:bgPr>
+        <a:solidFill>
+          <a:schemeClr val="bg1">
+            <a:lumMod val="95000"/>
+          </a:schemeClr>
+        </a:solidFill>
+        <a:effectLst/>
+      </p:bgPr>
     </p:bg>
     <p:spTree>
       <p:nvGrpSpPr>
@@ -5860,12 +6029,13 @@
     <p:sldLayoutId id="2147483673" r:id="rId10"/>
     <p:sldLayoutId id="2147483674" r:id="rId11"/>
     <p:sldLayoutId id="2147483675" r:id="rId12"/>
-    <p:sldLayoutId id="2147483676" r:id="rId13"/>
-    <p:sldLayoutId id="2147483677" r:id="rId14"/>
-    <p:sldLayoutId id="2147483678" r:id="rId15"/>
-    <p:sldLayoutId id="2147483679" r:id="rId16"/>
-    <p:sldLayoutId id="2147483680" r:id="rId17"/>
-    <p:sldLayoutId id="2147483681" r:id="rId18"/>
+    <p:sldLayoutId id="2147483682" r:id="rId13"/>
+    <p:sldLayoutId id="2147483676" r:id="rId14"/>
+    <p:sldLayoutId id="2147483677" r:id="rId15"/>
+    <p:sldLayoutId id="2147483678" r:id="rId16"/>
+    <p:sldLayoutId id="2147483679" r:id="rId17"/>
+    <p:sldLayoutId id="2147483680" r:id="rId18"/>
+    <p:sldLayoutId id="2147483681" r:id="rId19"/>
   </p:sldLayoutIdLst>
   <p:txStyles>
     <p:titleStyle>
@@ -6612,10 +6782,18 @@
             <a:spLocks noGrp="1"/>
           </p:cNvSpPr>
           <p:nvPr>
-            <p:ph type="body" sz="quarter" idx="10"/>
+            <p:ph type="body" sz="quarter" idx="4294967295"/>
           </p:nvPr>
         </p:nvSpPr>
-        <p:spPr/>
+        <p:spPr>
+          <a:xfrm>
+            <a:off x="2735627" y="164638"/>
+            <a:ext cx="9217024" cy="768085"/>
+          </a:xfrm>
+          <a:prstGeom prst="rect">
+            <a:avLst/>
+          </a:prstGeom>
+        </p:spPr>
         <p:txBody>
           <a:bodyPr/>
           <a:lstStyle/>
@@ -7255,10 +7433,18 @@
             <a:spLocks noGrp="1"/>
           </p:cNvSpPr>
           <p:nvPr>
-            <p:ph type="body" sz="quarter" idx="10"/>
+            <p:ph type="body" sz="quarter" idx="4294967295"/>
           </p:nvPr>
         </p:nvSpPr>
-        <p:spPr/>
+        <p:spPr>
+          <a:xfrm>
+            <a:off x="2735627" y="164638"/>
+            <a:ext cx="9217024" cy="768085"/>
+          </a:xfrm>
+          <a:prstGeom prst="rect">
+            <a:avLst/>
+          </a:prstGeom>
+        </p:spPr>
         <p:txBody>
           <a:bodyPr/>
           <a:lstStyle/>
@@ -13180,7 +13366,13 @@
       </p:grpSpPr>
       <p:sp>
         <p:nvSpPr>
-          <p:cNvPr id="2" name="Text Placeholder 1"/>
+          <p:cNvPr id="2" name="Text Placeholder 1">
+            <a:extLst>
+              <a:ext uri="{FF2B5EF4-FFF2-40B4-BE49-F238E27FC236}">
+                <a16:creationId xmlns:a16="http://schemas.microsoft.com/office/drawing/2014/main" id="{FDBFBBDA-9306-436C-9B9C-68209CB6AD3B}"/>
+              </a:ext>
+            </a:extLst>
+          </p:cNvPr>
           <p:cNvSpPr>
             <a:spLocks noGrp="1"/>
           </p:cNvSpPr>
@@ -13188,164 +13380,42 @@
             <p:ph type="body" sz="quarter" idx="10"/>
           </p:nvPr>
         </p:nvSpPr>
-        <p:spPr>
-          <a:xfrm>
-            <a:off x="2159563" y="5311114"/>
-            <a:ext cx="3936437" cy="768085"/>
-          </a:xfrm>
-        </p:spPr>
+        <p:spPr/>
         <p:txBody>
           <a:bodyPr/>
           <a:lstStyle/>
           <a:p>
             <a:r>
-              <a:rPr lang="en-US" altLang="ko-KR" b="1" dirty="0" err="1">
-                <a:solidFill>
-                  <a:schemeClr val="accent1"/>
-                </a:solidFill>
-                <a:latin typeface="+mj-lt"/>
-              </a:rPr>
+              <a:rPr lang="en-US" dirty="0" err="1"/>
               <a:t>Biểu</a:t>
             </a:r>
             <a:r>
-              <a:rPr lang="en-US" altLang="ko-KR" b="1" dirty="0">
-                <a:solidFill>
-                  <a:schemeClr val="accent1"/>
-                </a:solidFill>
-                <a:latin typeface="+mj-lt"/>
-              </a:rPr>
+              <a:rPr lang="en-US" dirty="0"/>
               <a:t> </a:t>
             </a:r>
             <a:r>
-              <a:rPr lang="en-US" altLang="ko-KR" b="1" dirty="0" err="1">
-                <a:solidFill>
-                  <a:schemeClr val="accent1"/>
-                </a:solidFill>
-                <a:latin typeface="+mj-lt"/>
-              </a:rPr>
+              <a:rPr lang="en-US" dirty="0" err="1"/>
               <a:t>đồ</a:t>
             </a:r>
-            <a:endParaRPr lang="ko-KR" altLang="en-US" b="1" dirty="0">
-              <a:solidFill>
-                <a:schemeClr val="accent1"/>
-              </a:solidFill>
-              <a:latin typeface="+mj-lt"/>
-            </a:endParaRPr>
-          </a:p>
-        </p:txBody>
-      </p:sp>
-      <p:sp>
-        <p:nvSpPr>
-          <p:cNvPr id="6" name="TextBox 5"/>
-          <p:cNvSpPr txBox="1"/>
-          <p:nvPr/>
-        </p:nvSpPr>
-        <p:spPr>
-          <a:xfrm>
-            <a:off x="6877338" y="5413027"/>
-            <a:ext cx="4608512" cy="564257"/>
-          </a:xfrm>
-          <a:prstGeom prst="rect">
-            <a:avLst/>
-          </a:prstGeom>
-          <a:noFill/>
-        </p:spPr>
-        <p:txBody>
-          <a:bodyPr wrap="square" rtlCol="0">
-            <a:spAutoFit/>
-          </a:bodyPr>
-          <a:lstStyle/>
-          <a:p>
-            <a:pPr marL="228600" lvl="0">
-              <a:lnSpc>
-                <a:spcPct val="120000"/>
-              </a:lnSpc>
-            </a:pPr>
-            <a:r>
-              <a:rPr lang="en-US" sz="2800" dirty="0" err="1">
-                <a:latin typeface="Times New Roman"/>
-                <a:ea typeface="Times New Roman"/>
-                <a:cs typeface="Times New Roman"/>
-                <a:sym typeface="Times New Roman"/>
-              </a:rPr>
-              <a:t>Biểu</a:t>
-            </a:r>
-            <a:r>
-              <a:rPr lang="en-US" sz="2800" dirty="0">
-                <a:latin typeface="Times New Roman"/>
-                <a:ea typeface="Times New Roman"/>
-                <a:cs typeface="Times New Roman"/>
-                <a:sym typeface="Times New Roman"/>
-              </a:rPr>
-              <a:t> </a:t>
-            </a:r>
-            <a:r>
-              <a:rPr lang="en-US" sz="2800" dirty="0" err="1">
-                <a:latin typeface="Times New Roman"/>
-                <a:ea typeface="Times New Roman"/>
-                <a:cs typeface="Times New Roman"/>
-                <a:sym typeface="Times New Roman"/>
-              </a:rPr>
-              <a:t>đồ</a:t>
-            </a:r>
-            <a:r>
-              <a:rPr lang="en-US" sz="2800">
-                <a:latin typeface="Times New Roman"/>
-                <a:ea typeface="Times New Roman"/>
-                <a:cs typeface="Times New Roman"/>
-                <a:sym typeface="Times New Roman"/>
-              </a:rPr>
-              <a:t> activity </a:t>
-            </a:r>
-            <a:r>
-              <a:rPr lang="en-US" sz="2800" dirty="0" err="1">
-                <a:latin typeface="Times New Roman"/>
-                <a:ea typeface="Times New Roman"/>
-                <a:cs typeface="Times New Roman"/>
-                <a:sym typeface="Times New Roman"/>
-              </a:rPr>
-              <a:t>Bán</a:t>
-            </a:r>
-            <a:r>
-              <a:rPr lang="en-US" sz="2800" dirty="0">
-                <a:latin typeface="Times New Roman"/>
-                <a:ea typeface="Times New Roman"/>
-                <a:cs typeface="Times New Roman"/>
-                <a:sym typeface="Times New Roman"/>
-              </a:rPr>
-              <a:t> </a:t>
-            </a:r>
-            <a:r>
-              <a:rPr lang="en-US" sz="2800" dirty="0" err="1">
-                <a:latin typeface="Times New Roman"/>
-                <a:ea typeface="Times New Roman"/>
-                <a:cs typeface="Times New Roman"/>
-                <a:sym typeface="Times New Roman"/>
-              </a:rPr>
-              <a:t>thuốc</a:t>
-            </a:r>
-            <a:endParaRPr lang="en-US" sz="2800" dirty="0">
-              <a:latin typeface="Times New Roman"/>
-              <a:ea typeface="Times New Roman"/>
-              <a:cs typeface="Times New Roman"/>
-              <a:sym typeface="Times New Roman"/>
-            </a:endParaRPr>
+            <a:endParaRPr lang="en-US" dirty="0"/>
           </a:p>
         </p:txBody>
       </p:sp>
       <p:pic>
         <p:nvPicPr>
-          <p:cNvPr id="7" name="Picture 6">
+          <p:cNvPr id="6" name="Picture Placeholder 5">
             <a:extLst>
               <a:ext uri="{FF2B5EF4-FFF2-40B4-BE49-F238E27FC236}">
-                <a16:creationId xmlns:a16="http://schemas.microsoft.com/office/drawing/2014/main" id="{100668EB-1ECA-4806-9953-DE469FB5F833}"/>
+                <a16:creationId xmlns:a16="http://schemas.microsoft.com/office/drawing/2014/main" id="{F9DCF4CA-14AA-46DA-86C9-8564BDC9304B}"/>
               </a:ext>
             </a:extLst>
           </p:cNvPr>
           <p:cNvPicPr>
-            <a:picLocks noChangeAspect="1"/>
+            <a:picLocks noGrp="1" noChangeAspect="1"/>
           </p:cNvPicPr>
-          <p:nvPr/>
+          <p:nvPr>
+            <p:ph type="pic" idx="1"/>
+          </p:nvPr>
         </p:nvPicPr>
         <p:blipFill>
           <a:blip r:embed="rId2">
@@ -13361,18 +13431,84 @@
         </p:blipFill>
         <p:spPr>
           <a:xfrm>
-            <a:off x="3849562" y="0"/>
-            <a:ext cx="4492875" cy="4909930"/>
+            <a:off x="3679478" y="0"/>
+            <a:ext cx="5163721" cy="5309419"/>
           </a:xfrm>
-          <a:prstGeom prst="rect">
-            <a:avLst/>
-          </a:prstGeom>
         </p:spPr>
       </p:pic>
+      <p:sp>
+        <p:nvSpPr>
+          <p:cNvPr id="4" name="Text Placeholder 3">
+            <a:extLst>
+              <a:ext uri="{FF2B5EF4-FFF2-40B4-BE49-F238E27FC236}">
+                <a16:creationId xmlns:a16="http://schemas.microsoft.com/office/drawing/2014/main" id="{5C957E74-18BF-40B5-98A6-1F3A1FDC50F6}"/>
+              </a:ext>
+            </a:extLst>
+          </p:cNvPr>
+          <p:cNvSpPr>
+            <a:spLocks noGrp="1"/>
+          </p:cNvSpPr>
+          <p:nvPr>
+            <p:ph type="body" sz="quarter" idx="11"/>
+          </p:nvPr>
+        </p:nvSpPr>
+        <p:spPr/>
+        <p:txBody>
+          <a:bodyPr/>
+          <a:lstStyle/>
+          <a:p>
+            <a:r>
+              <a:rPr lang="en-US" dirty="0" err="1"/>
+              <a:t>Biểu</a:t>
+            </a:r>
+            <a:r>
+              <a:rPr lang="en-US" dirty="0"/>
+              <a:t> </a:t>
+            </a:r>
+            <a:r>
+              <a:rPr lang="en-US" dirty="0" err="1"/>
+              <a:t>đồ</a:t>
+            </a:r>
+            <a:r>
+              <a:rPr lang="en-US" dirty="0"/>
+              <a:t> </a:t>
+            </a:r>
+            <a:r>
+              <a:rPr lang="en-US" dirty="0" err="1"/>
+              <a:t>hoạt</a:t>
+            </a:r>
+            <a:r>
+              <a:rPr lang="en-US" dirty="0"/>
+              <a:t> </a:t>
+            </a:r>
+            <a:r>
+              <a:rPr lang="en-US" dirty="0" err="1"/>
+              <a:t>động</a:t>
+            </a:r>
+            <a:r>
+              <a:rPr lang="en-US" dirty="0"/>
+              <a:t> – </a:t>
+            </a:r>
+            <a:r>
+              <a:rPr lang="en-US" dirty="0" err="1"/>
+              <a:t>Bán</a:t>
+            </a:r>
+            <a:r>
+              <a:rPr lang="en-US" dirty="0"/>
+              <a:t> </a:t>
+            </a:r>
+            <a:r>
+              <a:rPr lang="en-US" dirty="0" err="1"/>
+              <a:t>thuốc</a:t>
+            </a:r>
+            <a:endParaRPr lang="en-US" dirty="0"/>
+          </a:p>
+        </p:txBody>
+      </p:sp>
     </p:spTree>
     <p:extLst>
       <p:ext uri="{BB962C8B-B14F-4D97-AF65-F5344CB8AC3E}">
-        <p14:creationId xmlns:p14="http://schemas.microsoft.com/office/powerpoint/2010/main" val="2013294854"/>
+        <p14:creationId xmlns:p14="http://schemas.microsoft.com/office/powerpoint/2010/main" val="4201222422"/>
       </p:ext>
     </p:extLst>
   </p:cSld>
@@ -13401,7 +13537,13 @@
       </p:grpSpPr>
       <p:sp>
         <p:nvSpPr>
-          <p:cNvPr id="2" name="Text Placeholder 1"/>
+          <p:cNvPr id="2" name="Text Placeholder 1">
+            <a:extLst>
+              <a:ext uri="{FF2B5EF4-FFF2-40B4-BE49-F238E27FC236}">
+                <a16:creationId xmlns:a16="http://schemas.microsoft.com/office/drawing/2014/main" id="{FDBFBBDA-9306-436C-9B9C-68209CB6AD3B}"/>
+              </a:ext>
+            </a:extLst>
+          </p:cNvPr>
           <p:cNvSpPr>
             <a:spLocks noGrp="1"/>
           </p:cNvSpPr>
@@ -13411,8 +13553,8 @@
         </p:nvSpPr>
         <p:spPr>
           <a:xfrm>
-            <a:off x="2159563" y="5311114"/>
-            <a:ext cx="3936437" cy="768085"/>
+            <a:off x="2168528" y="5433134"/>
+            <a:ext cx="2737769" cy="768085"/>
           </a:xfrm>
         </p:spPr>
         <p:txBody>
@@ -13420,153 +13562,36 @@
           <a:lstStyle/>
           <a:p>
             <a:r>
-              <a:rPr lang="en-US" altLang="ko-KR" b="1" dirty="0" err="1">
-                <a:solidFill>
-                  <a:schemeClr val="accent1"/>
-                </a:solidFill>
-                <a:latin typeface="+mj-lt"/>
-              </a:rPr>
+              <a:rPr lang="en-US" dirty="0" err="1"/>
               <a:t>Biểu</a:t>
             </a:r>
             <a:r>
-              <a:rPr lang="en-US" altLang="ko-KR" b="1" dirty="0">
-                <a:solidFill>
-                  <a:schemeClr val="accent1"/>
-                </a:solidFill>
-                <a:latin typeface="+mj-lt"/>
-              </a:rPr>
+              <a:rPr lang="en-US" dirty="0"/>
               <a:t> </a:t>
             </a:r>
             <a:r>
-              <a:rPr lang="en-US" altLang="ko-KR" b="1" dirty="0" err="1">
-                <a:solidFill>
-                  <a:schemeClr val="accent1"/>
-                </a:solidFill>
-                <a:latin typeface="+mj-lt"/>
-              </a:rPr>
+              <a:rPr lang="en-US" dirty="0" err="1"/>
               <a:t>đồ</a:t>
             </a:r>
-            <a:endParaRPr lang="ko-KR" altLang="en-US" b="1" dirty="0">
-              <a:solidFill>
-                <a:schemeClr val="accent1"/>
-              </a:solidFill>
-              <a:latin typeface="+mj-lt"/>
-            </a:endParaRPr>
-          </a:p>
-        </p:txBody>
-      </p:sp>
-      <p:sp>
-        <p:nvSpPr>
-          <p:cNvPr id="6" name="TextBox 5"/>
-          <p:cNvSpPr txBox="1"/>
-          <p:nvPr/>
-        </p:nvSpPr>
-        <p:spPr>
-          <a:xfrm>
-            <a:off x="6877338" y="5413027"/>
-            <a:ext cx="4608512" cy="564257"/>
-          </a:xfrm>
-          <a:prstGeom prst="rect">
-            <a:avLst/>
-          </a:prstGeom>
-          <a:noFill/>
-        </p:spPr>
-        <p:txBody>
-          <a:bodyPr wrap="square" rtlCol="0">
-            <a:spAutoFit/>
-          </a:bodyPr>
-          <a:lstStyle/>
-          <a:p>
-            <a:pPr marL="228600" lvl="0">
-              <a:lnSpc>
-                <a:spcPct val="120000"/>
-              </a:lnSpc>
-            </a:pPr>
-            <a:r>
-              <a:rPr lang="en-US" sz="2800" dirty="0" err="1">
-                <a:latin typeface="Times New Roman"/>
-                <a:ea typeface="Times New Roman"/>
-                <a:cs typeface="Times New Roman"/>
-                <a:sym typeface="Times New Roman"/>
-              </a:rPr>
-              <a:t>Biểu</a:t>
-            </a:r>
-            <a:r>
-              <a:rPr lang="en-US" sz="2800" dirty="0">
-                <a:latin typeface="Times New Roman"/>
-                <a:ea typeface="Times New Roman"/>
-                <a:cs typeface="Times New Roman"/>
-                <a:sym typeface="Times New Roman"/>
-              </a:rPr>
-              <a:t> </a:t>
-            </a:r>
-            <a:r>
-              <a:rPr lang="en-US" sz="2800" dirty="0" err="1">
-                <a:latin typeface="Times New Roman"/>
-                <a:ea typeface="Times New Roman"/>
-                <a:cs typeface="Times New Roman"/>
-                <a:sym typeface="Times New Roman"/>
-              </a:rPr>
-              <a:t>đồ</a:t>
-            </a:r>
-            <a:r>
-              <a:rPr lang="en-US" sz="2800" dirty="0">
-                <a:latin typeface="Times New Roman"/>
-                <a:ea typeface="Times New Roman"/>
-                <a:cs typeface="Times New Roman"/>
-                <a:sym typeface="Times New Roman"/>
-              </a:rPr>
-              <a:t> activity </a:t>
-            </a:r>
-            <a:r>
-              <a:rPr lang="en-US" sz="2800" dirty="0" err="1">
-                <a:latin typeface="Times New Roman"/>
-                <a:ea typeface="Times New Roman"/>
-                <a:cs typeface="Times New Roman"/>
-                <a:sym typeface="Times New Roman"/>
-              </a:rPr>
-              <a:t>Nhập</a:t>
-            </a:r>
-            <a:r>
-              <a:rPr lang="en-US" sz="2800" dirty="0">
-                <a:latin typeface="Times New Roman"/>
-                <a:ea typeface="Times New Roman"/>
-                <a:cs typeface="Times New Roman"/>
-                <a:sym typeface="Times New Roman"/>
-              </a:rPr>
-              <a:t> </a:t>
-            </a:r>
-            <a:r>
-              <a:rPr lang="en-US" sz="2800" dirty="0" err="1">
-                <a:latin typeface="Times New Roman"/>
-                <a:ea typeface="Times New Roman"/>
-                <a:cs typeface="Times New Roman"/>
-                <a:sym typeface="Times New Roman"/>
-              </a:rPr>
-              <a:t>thuốc</a:t>
-            </a:r>
-            <a:endParaRPr lang="vi-VN" sz="2800" dirty="0">
-              <a:latin typeface="Times New Roman"/>
-              <a:ea typeface="Times New Roman"/>
-              <a:cs typeface="Times New Roman"/>
-              <a:sym typeface="Times New Roman"/>
-            </a:endParaRPr>
+            <a:endParaRPr lang="en-US" dirty="0"/>
           </a:p>
         </p:txBody>
       </p:sp>
       <p:pic>
         <p:nvPicPr>
-          <p:cNvPr id="7" name="Picture 6">
+          <p:cNvPr id="6" name="Picture Placeholder 5">
             <a:extLst>
               <a:ext uri="{FF2B5EF4-FFF2-40B4-BE49-F238E27FC236}">
-                <a16:creationId xmlns:a16="http://schemas.microsoft.com/office/drawing/2014/main" id="{100668EB-1ECA-4806-9953-DE469FB5F833}"/>
+                <a16:creationId xmlns:a16="http://schemas.microsoft.com/office/drawing/2014/main" id="{F9DCF4CA-14AA-46DA-86C9-8564BDC9304B}"/>
               </a:ext>
             </a:extLst>
           </p:cNvPr>
           <p:cNvPicPr>
-            <a:picLocks noChangeAspect="1"/>
+            <a:picLocks noGrp="1" noChangeAspect="1"/>
           </p:cNvPicPr>
-          <p:nvPr/>
+          <p:nvPr>
+            <p:ph type="pic" idx="1"/>
+          </p:nvPr>
         </p:nvPicPr>
         <p:blipFill>
           <a:blip r:embed="rId2">
@@ -13582,18 +13607,84 @@
         </p:blipFill>
         <p:spPr>
           <a:xfrm>
-            <a:off x="4188943" y="0"/>
-            <a:ext cx="3814113" cy="4909930"/>
+            <a:off x="3829649" y="0"/>
+            <a:ext cx="4863378" cy="5309419"/>
           </a:xfrm>
-          <a:prstGeom prst="rect">
-            <a:avLst/>
-          </a:prstGeom>
         </p:spPr>
       </p:pic>
+      <p:sp>
+        <p:nvSpPr>
+          <p:cNvPr id="4" name="Text Placeholder 3">
+            <a:extLst>
+              <a:ext uri="{FF2B5EF4-FFF2-40B4-BE49-F238E27FC236}">
+                <a16:creationId xmlns:a16="http://schemas.microsoft.com/office/drawing/2014/main" id="{5C957E74-18BF-40B5-98A6-1F3A1FDC50F6}"/>
+              </a:ext>
+            </a:extLst>
+          </p:cNvPr>
+          <p:cNvSpPr>
+            <a:spLocks noGrp="1"/>
+          </p:cNvSpPr>
+          <p:nvPr>
+            <p:ph type="body" sz="quarter" idx="11"/>
+          </p:nvPr>
+        </p:nvSpPr>
+        <p:spPr/>
+        <p:txBody>
+          <a:bodyPr/>
+          <a:lstStyle/>
+          <a:p>
+            <a:r>
+              <a:rPr lang="en-US" dirty="0" err="1"/>
+              <a:t>Biểu</a:t>
+            </a:r>
+            <a:r>
+              <a:rPr lang="en-US" dirty="0"/>
+              <a:t> </a:t>
+            </a:r>
+            <a:r>
+              <a:rPr lang="en-US" dirty="0" err="1"/>
+              <a:t>đồ</a:t>
+            </a:r>
+            <a:r>
+              <a:rPr lang="en-US" dirty="0"/>
+              <a:t> </a:t>
+            </a:r>
+            <a:r>
+              <a:rPr lang="en-US" dirty="0" err="1"/>
+              <a:t>hoạt</a:t>
+            </a:r>
+            <a:r>
+              <a:rPr lang="en-US" dirty="0"/>
+              <a:t> </a:t>
+            </a:r>
+            <a:r>
+              <a:rPr lang="en-US" dirty="0" err="1"/>
+              <a:t>động</a:t>
+            </a:r>
+            <a:r>
+              <a:rPr lang="en-US" dirty="0"/>
+              <a:t> -  </a:t>
+            </a:r>
+            <a:r>
+              <a:rPr lang="en-US" dirty="0" err="1"/>
+              <a:t>Nhập</a:t>
+            </a:r>
+            <a:r>
+              <a:rPr lang="en-US" dirty="0"/>
+              <a:t> </a:t>
+            </a:r>
+            <a:r>
+              <a:rPr lang="en-US" dirty="0" err="1"/>
+              <a:t>thuốc</a:t>
+            </a:r>
+            <a:endParaRPr lang="en-US" dirty="0"/>
+          </a:p>
+        </p:txBody>
+      </p:sp>
     </p:spTree>
     <p:extLst>
       <p:ext uri="{BB962C8B-B14F-4D97-AF65-F5344CB8AC3E}">
-        <p14:creationId xmlns:p14="http://schemas.microsoft.com/office/powerpoint/2010/main" val="1536322771"/>
+        <p14:creationId xmlns:p14="http://schemas.microsoft.com/office/powerpoint/2010/main" val="3092310107"/>
       </p:ext>
     </p:extLst>
   </p:cSld>
@@ -13622,7 +13713,13 @@
       </p:grpSpPr>
       <p:sp>
         <p:nvSpPr>
-          <p:cNvPr id="2" name="Text Placeholder 1"/>
+          <p:cNvPr id="2" name="Text Placeholder 1">
+            <a:extLst>
+              <a:ext uri="{FF2B5EF4-FFF2-40B4-BE49-F238E27FC236}">
+                <a16:creationId xmlns:a16="http://schemas.microsoft.com/office/drawing/2014/main" id="{FDBFBBDA-9306-436C-9B9C-68209CB6AD3B}"/>
+              </a:ext>
+            </a:extLst>
+          </p:cNvPr>
           <p:cNvSpPr>
             <a:spLocks noGrp="1"/>
           </p:cNvSpPr>
@@ -13632,8 +13729,8 @@
         </p:nvSpPr>
         <p:spPr>
           <a:xfrm>
-            <a:off x="2159563" y="5311114"/>
-            <a:ext cx="3936437" cy="768085"/>
+            <a:off x="2168528" y="5433134"/>
+            <a:ext cx="2718104" cy="768085"/>
           </a:xfrm>
         </p:spPr>
         <p:txBody>
@@ -13641,153 +13738,36 @@
           <a:lstStyle/>
           <a:p>
             <a:r>
-              <a:rPr lang="en-US" altLang="ko-KR" b="1" dirty="0" err="1">
-                <a:solidFill>
-                  <a:schemeClr val="accent1"/>
-                </a:solidFill>
-                <a:latin typeface="+mj-lt"/>
-              </a:rPr>
+              <a:rPr lang="en-US" dirty="0" err="1"/>
               <a:t>Biểu</a:t>
             </a:r>
             <a:r>
-              <a:rPr lang="en-US" altLang="ko-KR" b="1" dirty="0">
-                <a:solidFill>
-                  <a:schemeClr val="accent1"/>
-                </a:solidFill>
-                <a:latin typeface="+mj-lt"/>
-              </a:rPr>
+              <a:rPr lang="en-US" dirty="0"/>
               <a:t> </a:t>
             </a:r>
             <a:r>
-              <a:rPr lang="en-US" altLang="ko-KR" b="1" dirty="0" err="1">
-                <a:solidFill>
-                  <a:schemeClr val="accent1"/>
-                </a:solidFill>
-                <a:latin typeface="+mj-lt"/>
-              </a:rPr>
+              <a:rPr lang="en-US" dirty="0" err="1"/>
               <a:t>đồ</a:t>
             </a:r>
-            <a:endParaRPr lang="ko-KR" altLang="en-US" b="1" dirty="0">
-              <a:solidFill>
-                <a:schemeClr val="accent1"/>
-              </a:solidFill>
-              <a:latin typeface="+mj-lt"/>
-            </a:endParaRPr>
-          </a:p>
-        </p:txBody>
-      </p:sp>
-      <p:sp>
-        <p:nvSpPr>
-          <p:cNvPr id="6" name="TextBox 5"/>
-          <p:cNvSpPr txBox="1"/>
-          <p:nvPr/>
-        </p:nvSpPr>
-        <p:spPr>
-          <a:xfrm>
-            <a:off x="6877338" y="5413027"/>
-            <a:ext cx="4608512" cy="564257"/>
-          </a:xfrm>
-          <a:prstGeom prst="rect">
-            <a:avLst/>
-          </a:prstGeom>
-          <a:noFill/>
-        </p:spPr>
-        <p:txBody>
-          <a:bodyPr wrap="square" rtlCol="0">
-            <a:spAutoFit/>
-          </a:bodyPr>
-          <a:lstStyle/>
-          <a:p>
-            <a:pPr marL="228600" lvl="0">
-              <a:lnSpc>
-                <a:spcPct val="120000"/>
-              </a:lnSpc>
-            </a:pPr>
-            <a:r>
-              <a:rPr lang="en-US" sz="2800" dirty="0" err="1">
-                <a:latin typeface="Times New Roman"/>
-                <a:ea typeface="Times New Roman"/>
-                <a:cs typeface="Times New Roman"/>
-                <a:sym typeface="Times New Roman"/>
-              </a:rPr>
-              <a:t>Biểu</a:t>
-            </a:r>
-            <a:r>
-              <a:rPr lang="en-US" sz="2800" dirty="0">
-                <a:latin typeface="Times New Roman"/>
-                <a:ea typeface="Times New Roman"/>
-                <a:cs typeface="Times New Roman"/>
-                <a:sym typeface="Times New Roman"/>
-              </a:rPr>
-              <a:t> </a:t>
-            </a:r>
-            <a:r>
-              <a:rPr lang="en-US" sz="2800" dirty="0" err="1">
-                <a:latin typeface="Times New Roman"/>
-                <a:ea typeface="Times New Roman"/>
-                <a:cs typeface="Times New Roman"/>
-                <a:sym typeface="Times New Roman"/>
-              </a:rPr>
-              <a:t>đồ</a:t>
-            </a:r>
-            <a:r>
-              <a:rPr lang="en-US" sz="2800" dirty="0">
-                <a:latin typeface="Times New Roman"/>
-                <a:ea typeface="Times New Roman"/>
-                <a:cs typeface="Times New Roman"/>
-                <a:sym typeface="Times New Roman"/>
-              </a:rPr>
-              <a:t> activity </a:t>
-            </a:r>
-            <a:r>
-              <a:rPr lang="en-US" sz="2800" dirty="0" err="1">
-                <a:latin typeface="Times New Roman"/>
-                <a:ea typeface="Times New Roman"/>
-                <a:cs typeface="Times New Roman"/>
-                <a:sym typeface="Times New Roman"/>
-              </a:rPr>
-              <a:t>Trả</a:t>
-            </a:r>
-            <a:r>
-              <a:rPr lang="en-US" sz="2800" dirty="0">
-                <a:latin typeface="Times New Roman"/>
-                <a:ea typeface="Times New Roman"/>
-                <a:cs typeface="Times New Roman"/>
-                <a:sym typeface="Times New Roman"/>
-              </a:rPr>
-              <a:t> </a:t>
-            </a:r>
-            <a:r>
-              <a:rPr lang="en-US" sz="2800" dirty="0" err="1">
-                <a:latin typeface="Times New Roman"/>
-                <a:ea typeface="Times New Roman"/>
-                <a:cs typeface="Times New Roman"/>
-                <a:sym typeface="Times New Roman"/>
-              </a:rPr>
-              <a:t>thuốc</a:t>
-            </a:r>
-            <a:endParaRPr lang="vi-VN" sz="2800" dirty="0">
-              <a:latin typeface="Times New Roman"/>
-              <a:ea typeface="Times New Roman"/>
-              <a:cs typeface="Times New Roman"/>
-              <a:sym typeface="Times New Roman"/>
-            </a:endParaRPr>
+            <a:endParaRPr lang="en-US" dirty="0"/>
           </a:p>
         </p:txBody>
       </p:sp>
       <p:pic>
         <p:nvPicPr>
-          <p:cNvPr id="7" name="Picture 6">
+          <p:cNvPr id="6" name="Picture Placeholder 5">
             <a:extLst>
               <a:ext uri="{FF2B5EF4-FFF2-40B4-BE49-F238E27FC236}">
-                <a16:creationId xmlns:a16="http://schemas.microsoft.com/office/drawing/2014/main" id="{100668EB-1ECA-4806-9953-DE469FB5F833}"/>
+                <a16:creationId xmlns:a16="http://schemas.microsoft.com/office/drawing/2014/main" id="{F9DCF4CA-14AA-46DA-86C9-8564BDC9304B}"/>
               </a:ext>
             </a:extLst>
           </p:cNvPr>
           <p:cNvPicPr>
-            <a:picLocks noChangeAspect="1"/>
+            <a:picLocks noGrp="1" noChangeAspect="1"/>
           </p:cNvPicPr>
-          <p:nvPr/>
+          <p:nvPr>
+            <p:ph type="pic" idx="1"/>
+          </p:nvPr>
         </p:nvPicPr>
         <p:blipFill>
           <a:blip r:embed="rId2">
@@ -13803,18 +13783,92 @@
         </p:blipFill>
         <p:spPr>
           <a:xfrm>
-            <a:off x="4065554" y="0"/>
-            <a:ext cx="4060891" cy="4909930"/>
+            <a:off x="3935121" y="0"/>
+            <a:ext cx="4652433" cy="5309419"/>
           </a:xfrm>
-          <a:prstGeom prst="rect">
-            <a:avLst/>
-          </a:prstGeom>
         </p:spPr>
       </p:pic>
+      <p:sp>
+        <p:nvSpPr>
+          <p:cNvPr id="4" name="Text Placeholder 3">
+            <a:extLst>
+              <a:ext uri="{FF2B5EF4-FFF2-40B4-BE49-F238E27FC236}">
+                <a16:creationId xmlns:a16="http://schemas.microsoft.com/office/drawing/2014/main" id="{5C957E74-18BF-40B5-98A6-1F3A1FDC50F6}"/>
+              </a:ext>
+            </a:extLst>
+          </p:cNvPr>
+          <p:cNvSpPr>
+            <a:spLocks noGrp="1"/>
+          </p:cNvSpPr>
+          <p:nvPr>
+            <p:ph type="body" sz="quarter" idx="11"/>
+          </p:nvPr>
+        </p:nvSpPr>
+        <p:spPr/>
+        <p:txBody>
+          <a:bodyPr/>
+          <a:lstStyle/>
+          <a:p>
+            <a:r>
+              <a:rPr lang="en-US" dirty="0" err="1"/>
+              <a:t>Biểu</a:t>
+            </a:r>
+            <a:r>
+              <a:rPr lang="en-US" dirty="0"/>
+              <a:t> </a:t>
+            </a:r>
+            <a:r>
+              <a:rPr lang="en-US" dirty="0" err="1"/>
+              <a:t>đồ</a:t>
+            </a:r>
+            <a:r>
+              <a:rPr lang="en-US" dirty="0"/>
+              <a:t> </a:t>
+            </a:r>
+            <a:r>
+              <a:rPr lang="en-US" dirty="0" err="1"/>
+              <a:t>hoạt</a:t>
+            </a:r>
+            <a:r>
+              <a:rPr lang="en-US" dirty="0"/>
+              <a:t> </a:t>
+            </a:r>
+            <a:r>
+              <a:rPr lang="en-US" dirty="0" err="1"/>
+              <a:t>động</a:t>
+            </a:r>
+            <a:r>
+              <a:rPr lang="en-US" dirty="0"/>
+              <a:t> – </a:t>
+            </a:r>
+            <a:r>
+              <a:rPr lang="en-US" dirty="0" err="1"/>
+              <a:t>Khách</a:t>
+            </a:r>
+            <a:r>
+              <a:rPr lang="en-US" dirty="0"/>
+              <a:t> </a:t>
+            </a:r>
+            <a:r>
+              <a:rPr lang="en-US" dirty="0" err="1"/>
+              <a:t>trả</a:t>
+            </a:r>
+            <a:r>
+              <a:rPr lang="en-US" dirty="0"/>
+              <a:t> </a:t>
+            </a:r>
+            <a:r>
+              <a:rPr lang="en-US" dirty="0" err="1"/>
+              <a:t>thuốc</a:t>
+            </a:r>
+            <a:endParaRPr lang="en-US" dirty="0"/>
+          </a:p>
+        </p:txBody>
+      </p:sp>
     </p:spTree>
     <p:extLst>
       <p:ext uri="{BB962C8B-B14F-4D97-AF65-F5344CB8AC3E}">
-        <p14:creationId xmlns:p14="http://schemas.microsoft.com/office/powerpoint/2010/main" val="1688995633"/>
+        <p14:creationId xmlns:p14="http://schemas.microsoft.com/office/powerpoint/2010/main" val="4187663389"/>
       </p:ext>
     </p:extLst>
   </p:cSld>
@@ -13843,7 +13897,13 @@
       </p:grpSpPr>
       <p:sp>
         <p:nvSpPr>
-          <p:cNvPr id="2" name="Text Placeholder 1"/>
+          <p:cNvPr id="2" name="Text Placeholder 1">
+            <a:extLst>
+              <a:ext uri="{FF2B5EF4-FFF2-40B4-BE49-F238E27FC236}">
+                <a16:creationId xmlns:a16="http://schemas.microsoft.com/office/drawing/2014/main" id="{FDBFBBDA-9306-436C-9B9C-68209CB6AD3B}"/>
+              </a:ext>
+            </a:extLst>
+          </p:cNvPr>
           <p:cNvSpPr>
             <a:spLocks noGrp="1"/>
           </p:cNvSpPr>
@@ -13851,182 +13911,41 @@
             <p:ph type="body" sz="quarter" idx="10"/>
           </p:nvPr>
         </p:nvSpPr>
-        <p:spPr>
-          <a:xfrm>
-            <a:off x="2159563" y="5311114"/>
-            <a:ext cx="3936437" cy="768085"/>
-          </a:xfrm>
-        </p:spPr>
+        <p:spPr/>
         <p:txBody>
           <a:bodyPr/>
           <a:lstStyle/>
           <a:p>
             <a:r>
-              <a:rPr lang="en-US" altLang="ko-KR" b="1" dirty="0" err="1">
-                <a:solidFill>
-                  <a:schemeClr val="accent1"/>
-                </a:solidFill>
-                <a:latin typeface="+mj-lt"/>
-              </a:rPr>
+              <a:rPr lang="en-US" dirty="0" err="1"/>
               <a:t>Biểu</a:t>
             </a:r>
             <a:r>
-              <a:rPr lang="en-US" altLang="ko-KR" b="1" dirty="0">
-                <a:solidFill>
-                  <a:schemeClr val="accent1"/>
-                </a:solidFill>
-                <a:latin typeface="+mj-lt"/>
-              </a:rPr>
+              <a:rPr lang="en-US" dirty="0"/>
               <a:t> </a:t>
             </a:r>
             <a:r>
-              <a:rPr lang="en-US" altLang="ko-KR" b="1" dirty="0" err="1">
-                <a:solidFill>
-                  <a:schemeClr val="accent1"/>
-                </a:solidFill>
-                <a:latin typeface="+mj-lt"/>
-              </a:rPr>
+              <a:rPr lang="en-US"/>
               <a:t>đồ</a:t>
             </a:r>
-            <a:endParaRPr lang="ko-KR" altLang="en-US" b="1" dirty="0">
-              <a:solidFill>
-                <a:schemeClr val="accent1"/>
-              </a:solidFill>
-              <a:latin typeface="+mj-lt"/>
-            </a:endParaRPr>
-          </a:p>
-        </p:txBody>
-      </p:sp>
-      <p:sp>
-        <p:nvSpPr>
-          <p:cNvPr id="6" name="TextBox 5"/>
-          <p:cNvSpPr txBox="1"/>
-          <p:nvPr/>
-        </p:nvSpPr>
-        <p:spPr>
-          <a:xfrm>
-            <a:off x="6877338" y="5413027"/>
-            <a:ext cx="4608512" cy="564257"/>
-          </a:xfrm>
-          <a:prstGeom prst="rect">
-            <a:avLst/>
-          </a:prstGeom>
-          <a:noFill/>
-        </p:spPr>
-        <p:txBody>
-          <a:bodyPr wrap="square" rtlCol="0">
-            <a:spAutoFit/>
-          </a:bodyPr>
-          <a:lstStyle/>
-          <a:p>
-            <a:pPr marL="228600" lvl="0">
-              <a:lnSpc>
-                <a:spcPct val="120000"/>
-              </a:lnSpc>
-            </a:pPr>
-            <a:r>
-              <a:rPr lang="en-US" sz="2800" dirty="0" err="1">
-                <a:latin typeface="Times New Roman"/>
-                <a:ea typeface="Times New Roman"/>
-                <a:cs typeface="Times New Roman"/>
-                <a:sym typeface="Times New Roman"/>
-              </a:rPr>
-              <a:t>Biểu</a:t>
-            </a:r>
-            <a:r>
-              <a:rPr lang="en-US" sz="2800" dirty="0">
-                <a:latin typeface="Times New Roman"/>
-                <a:ea typeface="Times New Roman"/>
-                <a:cs typeface="Times New Roman"/>
-                <a:sym typeface="Times New Roman"/>
-              </a:rPr>
-              <a:t> </a:t>
-            </a:r>
-            <a:r>
-              <a:rPr lang="en-US" sz="2800" dirty="0" err="1">
-                <a:latin typeface="Times New Roman"/>
-                <a:ea typeface="Times New Roman"/>
-                <a:cs typeface="Times New Roman"/>
-                <a:sym typeface="Times New Roman"/>
-              </a:rPr>
-              <a:t>đồ</a:t>
-            </a:r>
-            <a:r>
-              <a:rPr lang="en-US" sz="2800" dirty="0">
-                <a:latin typeface="Times New Roman"/>
-                <a:ea typeface="Times New Roman"/>
-                <a:cs typeface="Times New Roman"/>
-                <a:sym typeface="Times New Roman"/>
-              </a:rPr>
-              <a:t> activity </a:t>
-            </a:r>
-            <a:r>
-              <a:rPr lang="en-US" sz="2800" dirty="0" err="1">
-                <a:latin typeface="Times New Roman"/>
-                <a:ea typeface="Times New Roman"/>
-                <a:cs typeface="Times New Roman"/>
-                <a:sym typeface="Times New Roman"/>
-              </a:rPr>
-              <a:t>Thiết</a:t>
-            </a:r>
-            <a:r>
-              <a:rPr lang="en-US" sz="2800" dirty="0">
-                <a:latin typeface="Times New Roman"/>
-                <a:ea typeface="Times New Roman"/>
-                <a:cs typeface="Times New Roman"/>
-                <a:sym typeface="Times New Roman"/>
-              </a:rPr>
-              <a:t> </a:t>
-            </a:r>
-            <a:r>
-              <a:rPr lang="en-US" sz="2800" dirty="0" err="1">
-                <a:latin typeface="Times New Roman"/>
-                <a:ea typeface="Times New Roman"/>
-                <a:cs typeface="Times New Roman"/>
-                <a:sym typeface="Times New Roman"/>
-              </a:rPr>
-              <a:t>lập</a:t>
-            </a:r>
-            <a:r>
-              <a:rPr lang="en-US" sz="2800" dirty="0">
-                <a:latin typeface="Times New Roman"/>
-                <a:ea typeface="Times New Roman"/>
-                <a:cs typeface="Times New Roman"/>
-                <a:sym typeface="Times New Roman"/>
-              </a:rPr>
-              <a:t> </a:t>
-            </a:r>
-            <a:r>
-              <a:rPr lang="en-US" sz="2800" dirty="0" err="1">
-                <a:latin typeface="Times New Roman"/>
-                <a:ea typeface="Times New Roman"/>
-                <a:cs typeface="Times New Roman"/>
-                <a:sym typeface="Times New Roman"/>
-              </a:rPr>
-              <a:t>giá</a:t>
-            </a:r>
-            <a:endParaRPr lang="vi-VN" sz="2800" dirty="0">
-              <a:latin typeface="Times New Roman"/>
-              <a:ea typeface="Times New Roman"/>
-              <a:cs typeface="Times New Roman"/>
-              <a:sym typeface="Times New Roman"/>
-            </a:endParaRPr>
           </a:p>
         </p:txBody>
       </p:sp>
       <p:pic>
         <p:nvPicPr>
-          <p:cNvPr id="7" name="Picture 6">
+          <p:cNvPr id="6" name="Picture Placeholder 5">
             <a:extLst>
               <a:ext uri="{FF2B5EF4-FFF2-40B4-BE49-F238E27FC236}">
-                <a16:creationId xmlns:a16="http://schemas.microsoft.com/office/drawing/2014/main" id="{100668EB-1ECA-4806-9953-DE469FB5F833}"/>
+                <a16:creationId xmlns:a16="http://schemas.microsoft.com/office/drawing/2014/main" id="{F9DCF4CA-14AA-46DA-86C9-8564BDC9304B}"/>
               </a:ext>
             </a:extLst>
           </p:cNvPr>
           <p:cNvPicPr>
-            <a:picLocks noChangeAspect="1"/>
+            <a:picLocks noGrp="1" noChangeAspect="1"/>
           </p:cNvPicPr>
-          <p:nvPr/>
+          <p:nvPr>
+            <p:ph type="pic" idx="1"/>
+          </p:nvPr>
         </p:nvPicPr>
         <p:blipFill>
           <a:blip r:embed="rId2">
@@ -14042,18 +13961,92 @@
         </p:blipFill>
         <p:spPr>
           <a:xfrm>
-            <a:off x="3529950" y="0"/>
-            <a:ext cx="5132098" cy="4909930"/>
+            <a:off x="3829649" y="312640"/>
+            <a:ext cx="4863378" cy="4684138"/>
           </a:xfrm>
-          <a:prstGeom prst="rect">
-            <a:avLst/>
-          </a:prstGeom>
         </p:spPr>
       </p:pic>
+      <p:sp>
+        <p:nvSpPr>
+          <p:cNvPr id="4" name="Text Placeholder 3">
+            <a:extLst>
+              <a:ext uri="{FF2B5EF4-FFF2-40B4-BE49-F238E27FC236}">
+                <a16:creationId xmlns:a16="http://schemas.microsoft.com/office/drawing/2014/main" id="{5C957E74-18BF-40B5-98A6-1F3A1FDC50F6}"/>
+              </a:ext>
+            </a:extLst>
+          </p:cNvPr>
+          <p:cNvSpPr>
+            <a:spLocks noGrp="1"/>
+          </p:cNvSpPr>
+          <p:nvPr>
+            <p:ph type="body" sz="quarter" idx="11"/>
+          </p:nvPr>
+        </p:nvSpPr>
+        <p:spPr/>
+        <p:txBody>
+          <a:bodyPr/>
+          <a:lstStyle/>
+          <a:p>
+            <a:r>
+              <a:rPr lang="en-US" dirty="0" err="1"/>
+              <a:t>Biểu</a:t>
+            </a:r>
+            <a:r>
+              <a:rPr lang="en-US" dirty="0"/>
+              <a:t> </a:t>
+            </a:r>
+            <a:r>
+              <a:rPr lang="en-US" dirty="0" err="1"/>
+              <a:t>đồ</a:t>
+            </a:r>
+            <a:r>
+              <a:rPr lang="en-US" dirty="0"/>
+              <a:t> </a:t>
+            </a:r>
+            <a:r>
+              <a:rPr lang="en-US" dirty="0" err="1"/>
+              <a:t>hoạt</a:t>
+            </a:r>
+            <a:r>
+              <a:rPr lang="en-US" dirty="0"/>
+              <a:t> </a:t>
+            </a:r>
+            <a:r>
+              <a:rPr lang="en-US" dirty="0" err="1"/>
+              <a:t>động</a:t>
+            </a:r>
+            <a:r>
+              <a:rPr lang="en-US" dirty="0"/>
+              <a:t> – </a:t>
+            </a:r>
+            <a:r>
+              <a:rPr lang="en-US" dirty="0" err="1"/>
+              <a:t>Thiết</a:t>
+            </a:r>
+            <a:r>
+              <a:rPr lang="en-US" dirty="0"/>
+              <a:t> </a:t>
+            </a:r>
+            <a:r>
+              <a:rPr lang="en-US" dirty="0" err="1"/>
+              <a:t>lập</a:t>
+            </a:r>
+            <a:r>
+              <a:rPr lang="en-US" dirty="0"/>
+              <a:t> </a:t>
+            </a:r>
+            <a:r>
+              <a:rPr lang="en-US" dirty="0" err="1"/>
+              <a:t>giá</a:t>
+            </a:r>
+            <a:endParaRPr lang="en-US" dirty="0"/>
+          </a:p>
+        </p:txBody>
+      </p:sp>
     </p:spTree>
     <p:extLst>
       <p:ext uri="{BB962C8B-B14F-4D97-AF65-F5344CB8AC3E}">
-        <p14:creationId xmlns:p14="http://schemas.microsoft.com/office/powerpoint/2010/main" val="1774847393"/>
+        <p14:creationId xmlns:p14="http://schemas.microsoft.com/office/powerpoint/2010/main" val="1852046467"/>
       </p:ext>
     </p:extLst>
   </p:cSld>
@@ -27753,10 +27746,18 @@
             <a:spLocks noGrp="1"/>
           </p:cNvSpPr>
           <p:nvPr>
-            <p:ph type="body" sz="quarter" idx="10"/>
+            <p:ph type="body" sz="quarter" idx="4294967295"/>
           </p:nvPr>
         </p:nvSpPr>
-        <p:spPr/>
+        <p:spPr>
+          <a:xfrm>
+            <a:off x="2735627" y="164638"/>
+            <a:ext cx="9217024" cy="768085"/>
+          </a:xfrm>
+          <a:prstGeom prst="rect">
+            <a:avLst/>
+          </a:prstGeom>
+        </p:spPr>
         <p:txBody>
           <a:bodyPr/>
           <a:lstStyle/>
@@ -28436,10 +28437,18 @@
             <a:spLocks noGrp="1"/>
           </p:cNvSpPr>
           <p:nvPr>
-            <p:ph type="body" sz="quarter" idx="10"/>
+            <p:ph type="body" sz="quarter" idx="4294967295"/>
           </p:nvPr>
         </p:nvSpPr>
-        <p:spPr/>
+        <p:spPr>
+          <a:xfrm>
+            <a:off x="2735627" y="164638"/>
+            <a:ext cx="9217024" cy="768085"/>
+          </a:xfrm>
+          <a:prstGeom prst="rect">
+            <a:avLst/>
+          </a:prstGeom>
+        </p:spPr>
         <p:txBody>
           <a:bodyPr/>
           <a:lstStyle/>
@@ -29557,10 +29566,18 @@
             <a:spLocks noGrp="1"/>
           </p:cNvSpPr>
           <p:nvPr>
-            <p:ph type="body" sz="quarter" idx="10"/>
+            <p:ph type="body" sz="quarter" idx="4294967295"/>
           </p:nvPr>
         </p:nvSpPr>
-        <p:spPr/>
+        <p:spPr>
+          <a:xfrm>
+            <a:off x="2735627" y="164638"/>
+            <a:ext cx="9217024" cy="768085"/>
+          </a:xfrm>
+          <a:prstGeom prst="rect">
+            <a:avLst/>
+          </a:prstGeom>
+        </p:spPr>
         <p:txBody>
           <a:bodyPr/>
           <a:lstStyle/>

</xml_diff>

<commit_message>
sua loi chinh ta trong slide + sua bo cau hoi trong bao cao
</commit_message>
<xml_diff>
--- a/BTL.pptx
+++ b/BTL.pptx
@@ -26469,19 +26469,6 @@
                 </a:rPr>
                 <a:t>ứng</a:t>
               </a:r>
-              <a:r>
-                <a:rPr lang="en-US" altLang="ko-KR" dirty="0">
-                  <a:solidFill>
-                    <a:schemeClr val="tx1">
-                      <a:lumMod val="75000"/>
-                      <a:lumOff val="25000"/>
-                    </a:schemeClr>
-                  </a:solidFill>
-                  <a:latin typeface="Times New Roman" panose="02020603050405020304" pitchFamily="18" charset="0"/>
-                  <a:cs typeface="Times New Roman" panose="02020603050405020304" pitchFamily="18" charset="0"/>
-                </a:rPr>
-                <a:t> </a:t>
-              </a:r>
               <a:endParaRPr lang="ko-KR" altLang="en-US" dirty="0">
                 <a:solidFill>
                   <a:schemeClr val="tx1">
@@ -34700,8 +34687,19 @@
                 <a:latin typeface="Times New Roman" panose="02020603050405020304" pitchFamily="18" charset="0"/>
                 <a:cs typeface="Times New Roman" panose="02020603050405020304" pitchFamily="18" charset="0"/>
               </a:rPr>
-              <a:t> hang</a:t>
-            </a:r>
+              <a:t> </a:t>
+            </a:r>
+            <a:r>
+              <a:rPr lang="en-US" dirty="0" err="1">
+                <a:latin typeface="Times New Roman" panose="02020603050405020304" pitchFamily="18" charset="0"/>
+                <a:cs typeface="Times New Roman" panose="02020603050405020304" pitchFamily="18" charset="0"/>
+              </a:rPr>
+              <a:t>hàng</a:t>
+            </a:r>
+            <a:endParaRPr lang="en-US" dirty="0">
+              <a:latin typeface="Times New Roman" panose="02020603050405020304" pitchFamily="18" charset="0"/>
+              <a:cs typeface="Times New Roman" panose="02020603050405020304" pitchFamily="18" charset="0"/>
+            </a:endParaRPr>
           </a:p>
           <a:p>
             <a:endParaRPr lang="en-US" dirty="0">
@@ -34810,7 +34808,7 @@
                 <a:latin typeface="Times New Roman" panose="02020603050405020304" pitchFamily="18" charset="0"/>
                 <a:cs typeface="Times New Roman" panose="02020603050405020304" pitchFamily="18" charset="0"/>
               </a:rPr>
-              <a:t>loiaj</a:t>
+              <a:t>loại</a:t>
             </a:r>
             <a:r>
               <a:rPr lang="en-US" dirty="0">
@@ -35046,7 +35044,7 @@
                 <a:latin typeface="Times New Roman" panose="02020603050405020304" pitchFamily="18" charset="0"/>
                 <a:cs typeface="Times New Roman" panose="02020603050405020304" pitchFamily="18" charset="0"/>
               </a:rPr>
-              <a:t>khinh</a:t>
+              <a:t>kinh</a:t>
             </a:r>
             <a:r>
               <a:rPr lang="en-US" dirty="0">
@@ -35282,7 +35280,7 @@
                 <a:latin typeface="Times New Roman" panose="02020603050405020304" pitchFamily="18" charset="0"/>
                 <a:cs typeface="Times New Roman" panose="02020603050405020304" pitchFamily="18" charset="0"/>
               </a:rPr>
-              <a:t>trọ</a:t>
+              <a:t>trợ</a:t>
             </a:r>
             <a:r>
               <a:rPr lang="en-US" dirty="0">
@@ -35324,7 +35322,21 @@
                 <a:latin typeface="Times New Roman" panose="02020603050405020304" pitchFamily="18" charset="0"/>
                 <a:cs typeface="Times New Roman" panose="02020603050405020304" pitchFamily="18" charset="0"/>
               </a:rPr>
-              <a:t> dung: ng</a:t>
+              <a:t> </a:t>
+            </a:r>
+            <a:r>
+              <a:rPr lang="en-US" dirty="0" err="1">
+                <a:latin typeface="Times New Roman" panose="02020603050405020304" pitchFamily="18" charset="0"/>
+                <a:cs typeface="Times New Roman" panose="02020603050405020304" pitchFamily="18" charset="0"/>
+              </a:rPr>
+              <a:t>dùng</a:t>
+            </a:r>
+            <a:r>
+              <a:rPr lang="en-US" dirty="0">
+                <a:latin typeface="Times New Roman" panose="02020603050405020304" pitchFamily="18" charset="0"/>
+                <a:cs typeface="Times New Roman" panose="02020603050405020304" pitchFamily="18" charset="0"/>
+              </a:rPr>
+              <a:t>: ng</a:t>
             </a:r>
             <a:r>
               <a:rPr lang="vi-VN" dirty="0">

</xml_diff>

<commit_message>
Them bieu do trinh tu
</commit_message>
<xml_diff>
--- a/BTL.pptx
+++ b/BTL.pptx
@@ -1,12 +1,12 @@
 
 <file path=ppt/presentation.xml><?xml version="1.0" encoding="utf-8"?>
-<p:presentation xmlns:a="http://schemas.openxmlformats.org/drawingml/2006/main" xmlns:r="http://schemas.openxmlformats.org/officeDocument/2006/relationships" xmlns:p="http://schemas.openxmlformats.org/presentationml/2006/main" saveSubsetFonts="1">
+<p:presentation xmlns:a="http://schemas.openxmlformats.org/drawingml/2006/main" xmlns:r="http://schemas.openxmlformats.org/officeDocument/2006/relationships" xmlns:p="http://schemas.openxmlformats.org/presentationml/2006/main" showSpecialPlsOnTitleSld="0" saveSubsetFonts="1">
   <p:sldMasterIdLst>
     <p:sldMasterId id="2147483660" r:id="rId1"/>
     <p:sldMasterId id="2147483663" r:id="rId2"/>
   </p:sldMasterIdLst>
   <p:notesMasterIdLst>
-    <p:notesMasterId r:id="rId30"/>
+    <p:notesMasterId r:id="rId32"/>
   </p:notesMasterIdLst>
   <p:sldIdLst>
     <p:sldId id="256" r:id="rId3"/>
@@ -29,13 +29,15 @@
     <p:sldId id="292" r:id="rId20"/>
     <p:sldId id="293" r:id="rId21"/>
     <p:sldId id="294" r:id="rId22"/>
-    <p:sldId id="297" r:id="rId23"/>
-    <p:sldId id="298" r:id="rId24"/>
-    <p:sldId id="299" r:id="rId25"/>
-    <p:sldId id="300" r:id="rId26"/>
-    <p:sldId id="295" r:id="rId27"/>
-    <p:sldId id="296" r:id="rId28"/>
-    <p:sldId id="262" r:id="rId29"/>
+    <p:sldId id="302" r:id="rId23"/>
+    <p:sldId id="303" r:id="rId24"/>
+    <p:sldId id="297" r:id="rId25"/>
+    <p:sldId id="298" r:id="rId26"/>
+    <p:sldId id="299" r:id="rId27"/>
+    <p:sldId id="300" r:id="rId28"/>
+    <p:sldId id="295" r:id="rId29"/>
+    <p:sldId id="296" r:id="rId30"/>
+    <p:sldId id="262" r:id="rId31"/>
   </p:sldIdLst>
   <p:sldSz cx="12192000" cy="6858000"/>
   <p:notesSz cx="6858000" cy="9144000"/>
@@ -224,7 +226,7 @@
           <a:p>
             <a:fld id="{8BD3030E-DEB5-4B7E-96C6-C801CF3CD950}" type="datetimeFigureOut">
               <a:rPr lang="en-US" smtClean="0"/>
-              <a:t>5/3/2019</a:t>
+              <a:t>5/4/19</a:t>
             </a:fld>
             <a:endParaRPr lang="en-US"/>
           </a:p>
@@ -4741,7 +4743,7 @@
           <a:lstStyle/>
           <a:p>
             <a:pPr algn="ctr"/>
-            <a:endParaRPr lang="ko-KR" altLang="en-US" sz="2400"/>
+            <a:endParaRPr lang="ko-KR" altLang="en-US" sz="2400" dirty="0"/>
           </a:p>
         </p:txBody>
       </p:sp>
@@ -5729,6 +5731,7 @@
     <p:sldLayoutId id="2147483661" r:id="rId1"/>
     <p:sldLayoutId id="2147483662" r:id="rId2"/>
   </p:sldLayoutIdLst>
+  <p:hf hdr="0" ftr="0" dt="0"/>
   <p:txStyles>
     <p:titleStyle>
       <a:lvl1pPr algn="ctr" defTabSz="1219170" rtl="0" eaLnBrk="1" latinLnBrk="1" hangingPunct="1">
@@ -6038,6 +6041,7 @@
     <p:sldLayoutId id="2147483680" r:id="rId18"/>
     <p:sldLayoutId id="2147483681" r:id="rId19"/>
   </p:sldLayoutIdLst>
+  <p:hf hdr="0" ftr="0" dt="0"/>
   <p:txStyles>
     <p:titleStyle>
       <a:lvl1pPr algn="ctr" defTabSz="1219170" rtl="0" eaLnBrk="1" latinLnBrk="1" hangingPunct="1">
@@ -6725,16 +6729,6 @@
                 <a:cs typeface="Times New Roman" panose="02020603050405020304" pitchFamily="18" charset="0"/>
               </a:rPr>
               <a:t>mềm</a:t>
-            </a:r>
-            <a:r>
-              <a:rPr lang="en-US" altLang="ko-KR" sz="1600" dirty="0" err="1">
-                <a:solidFill>
-                  <a:prstClr val="white"/>
-                </a:solidFill>
-                <a:latin typeface="Times New Roman" panose="02020603050405020304" pitchFamily="18" charset="0"/>
-                <a:cs typeface="Times New Roman" panose="02020603050405020304" pitchFamily="18" charset="0"/>
-              </a:rPr>
-              <a:t>n</a:t>
             </a:r>
             <a:endParaRPr lang="ko-KR" altLang="en-US" sz="1600" dirty="0">
               <a:solidFill>
@@ -14617,6 +14611,356 @@
               <a:t> </a:t>
             </a:r>
             <a:r>
+              <a:rPr lang="en-US"/>
+              <a:t>đồ</a:t>
+            </a:r>
+          </a:p>
+        </p:txBody>
+      </p:sp>
+      <p:sp>
+        <p:nvSpPr>
+          <p:cNvPr id="4" name="Text Placeholder 3">
+            <a:extLst>
+              <a:ext uri="{FF2B5EF4-FFF2-40B4-BE49-F238E27FC236}">
+                <a16:creationId xmlns:a16="http://schemas.microsoft.com/office/drawing/2014/main" id="{5C957E74-18BF-40B5-98A6-1F3A1FDC50F6}"/>
+              </a:ext>
+            </a:extLst>
+          </p:cNvPr>
+          <p:cNvSpPr>
+            <a:spLocks noGrp="1"/>
+          </p:cNvSpPr>
+          <p:nvPr>
+            <p:ph type="body" sz="quarter" idx="11"/>
+          </p:nvPr>
+        </p:nvSpPr>
+        <p:spPr/>
+        <p:txBody>
+          <a:bodyPr/>
+          <a:lstStyle/>
+          <a:p>
+            <a:r>
+              <a:rPr lang="en-US" dirty="0" err="1"/>
+              <a:t>Biểu</a:t>
+            </a:r>
+            <a:r>
+              <a:rPr lang="en-US" dirty="0"/>
+              <a:t> </a:t>
+            </a:r>
+            <a:r>
+              <a:rPr lang="en-US" dirty="0" err="1"/>
+              <a:t>đồ</a:t>
+            </a:r>
+            <a:r>
+              <a:rPr lang="en-US" dirty="0"/>
+              <a:t> </a:t>
+            </a:r>
+            <a:r>
+              <a:rPr lang="en-US" dirty="0" err="1"/>
+              <a:t>trình</a:t>
+            </a:r>
+            <a:r>
+              <a:rPr lang="en-US" dirty="0"/>
+              <a:t> </a:t>
+            </a:r>
+            <a:r>
+              <a:rPr lang="en-US" dirty="0" err="1"/>
+              <a:t>tự</a:t>
+            </a:r>
+            <a:r>
+              <a:rPr lang="en-US" dirty="0"/>
+              <a:t> – </a:t>
+            </a:r>
+            <a:r>
+              <a:rPr lang="en-US" dirty="0" err="1"/>
+              <a:t>Sửa</a:t>
+            </a:r>
+            <a:r>
+              <a:rPr lang="en-US" dirty="0"/>
+              <a:t> </a:t>
+            </a:r>
+            <a:r>
+              <a:rPr lang="en-US" dirty="0" err="1"/>
+              <a:t>thuốc</a:t>
+            </a:r>
+            <a:endParaRPr lang="en-US" dirty="0"/>
+          </a:p>
+        </p:txBody>
+      </p:sp>
+      <p:pic>
+        <p:nvPicPr>
+          <p:cNvPr id="16" name="Picture 15">
+            <a:extLst>
+              <a:ext uri="{FF2B5EF4-FFF2-40B4-BE49-F238E27FC236}">
+                <a16:creationId xmlns:a16="http://schemas.microsoft.com/office/drawing/2014/main" id="{E1A12127-5E9A-2640-A940-FA78A99890EC}"/>
+              </a:ext>
+            </a:extLst>
+          </p:cNvPr>
+          <p:cNvPicPr>
+            <a:picLocks noChangeAspect="1"/>
+          </p:cNvPicPr>
+          <p:nvPr/>
+        </p:nvPicPr>
+        <p:blipFill>
+          <a:blip r:embed="rId2">
+            <a:extLst>
+              <a:ext uri="{28A0092B-C50C-407E-A947-70E740481C1C}">
+                <a14:useLocalDpi xmlns:a14="http://schemas.microsoft.com/office/drawing/2010/main" val="0"/>
+              </a:ext>
+            </a:extLst>
+          </a:blip>
+          <a:stretch>
+            <a:fillRect/>
+          </a:stretch>
+        </p:blipFill>
+        <p:spPr>
+          <a:xfrm>
+            <a:off x="2893963" y="246490"/>
+            <a:ext cx="6404074" cy="4925833"/>
+          </a:xfrm>
+          <a:prstGeom prst="rect">
+            <a:avLst/>
+          </a:prstGeom>
+        </p:spPr>
+      </p:pic>
+    </p:spTree>
+    <p:extLst>
+      <p:ext uri="{BB962C8B-B14F-4D97-AF65-F5344CB8AC3E}">
+        <p14:creationId xmlns:p14="http://schemas.microsoft.com/office/powerpoint/2010/main" val="289206565"/>
+      </p:ext>
+    </p:extLst>
+  </p:cSld>
+  <p:clrMapOvr>
+    <a:masterClrMapping/>
+  </p:clrMapOvr>
+</p:sld>
+</file>
+
+<file path=ppt/slides/slide22.xml><?xml version="1.0" encoding="utf-8"?>
+<p:sld xmlns:a="http://schemas.openxmlformats.org/drawingml/2006/main" xmlns:r="http://schemas.openxmlformats.org/officeDocument/2006/relationships" xmlns:p="http://schemas.openxmlformats.org/presentationml/2006/main">
+  <p:cSld>
+    <p:spTree>
+      <p:nvGrpSpPr>
+        <p:cNvPr id="1" name=""/>
+        <p:cNvGrpSpPr/>
+        <p:nvPr/>
+      </p:nvGrpSpPr>
+      <p:grpSpPr>
+        <a:xfrm>
+          <a:off x="0" y="0"/>
+          <a:ext cx="0" cy="0"/>
+          <a:chOff x="0" y="0"/>
+          <a:chExt cx="0" cy="0"/>
+        </a:xfrm>
+      </p:grpSpPr>
+      <p:sp>
+        <p:nvSpPr>
+          <p:cNvPr id="2" name="Text Placeholder 1">
+            <a:extLst>
+              <a:ext uri="{FF2B5EF4-FFF2-40B4-BE49-F238E27FC236}">
+                <a16:creationId xmlns:a16="http://schemas.microsoft.com/office/drawing/2014/main" id="{FDBFBBDA-9306-436C-9B9C-68209CB6AD3B}"/>
+              </a:ext>
+            </a:extLst>
+          </p:cNvPr>
+          <p:cNvSpPr>
+            <a:spLocks noGrp="1"/>
+          </p:cNvSpPr>
+          <p:nvPr>
+            <p:ph type="body" sz="quarter" idx="10"/>
+          </p:nvPr>
+        </p:nvSpPr>
+        <p:spPr/>
+        <p:txBody>
+          <a:bodyPr/>
+          <a:lstStyle/>
+          <a:p>
+            <a:r>
+              <a:rPr lang="en-US" dirty="0" err="1"/>
+              <a:t>Biểu</a:t>
+            </a:r>
+            <a:r>
+              <a:rPr lang="en-US" dirty="0"/>
+              <a:t> </a:t>
+            </a:r>
+            <a:r>
+              <a:rPr lang="en-US"/>
+              <a:t>đồ</a:t>
+            </a:r>
+          </a:p>
+        </p:txBody>
+      </p:sp>
+      <p:sp>
+        <p:nvSpPr>
+          <p:cNvPr id="4" name="Text Placeholder 3">
+            <a:extLst>
+              <a:ext uri="{FF2B5EF4-FFF2-40B4-BE49-F238E27FC236}">
+                <a16:creationId xmlns:a16="http://schemas.microsoft.com/office/drawing/2014/main" id="{5C957E74-18BF-40B5-98A6-1F3A1FDC50F6}"/>
+              </a:ext>
+            </a:extLst>
+          </p:cNvPr>
+          <p:cNvSpPr>
+            <a:spLocks noGrp="1"/>
+          </p:cNvSpPr>
+          <p:nvPr>
+            <p:ph type="body" sz="quarter" idx="11"/>
+          </p:nvPr>
+        </p:nvSpPr>
+        <p:spPr/>
+        <p:txBody>
+          <a:bodyPr/>
+          <a:lstStyle/>
+          <a:p>
+            <a:r>
+              <a:rPr lang="en-US" dirty="0" err="1"/>
+              <a:t>Biểu</a:t>
+            </a:r>
+            <a:r>
+              <a:rPr lang="en-US" dirty="0"/>
+              <a:t> </a:t>
+            </a:r>
+            <a:r>
+              <a:rPr lang="en-US" dirty="0" err="1"/>
+              <a:t>đồ</a:t>
+            </a:r>
+            <a:r>
+              <a:rPr lang="en-US" dirty="0"/>
+              <a:t> </a:t>
+            </a:r>
+            <a:r>
+              <a:rPr lang="en-US" dirty="0" err="1"/>
+              <a:t>trình</a:t>
+            </a:r>
+            <a:r>
+              <a:rPr lang="en-US" dirty="0"/>
+              <a:t> </a:t>
+            </a:r>
+            <a:r>
+              <a:rPr lang="en-US" dirty="0" err="1"/>
+              <a:t>tự</a:t>
+            </a:r>
+            <a:r>
+              <a:rPr lang="en-US" dirty="0"/>
+              <a:t> – </a:t>
+            </a:r>
+            <a:r>
+              <a:rPr lang="en-US" dirty="0" err="1"/>
+              <a:t>Lập</a:t>
+            </a:r>
+            <a:r>
+              <a:rPr lang="en-US" dirty="0"/>
+              <a:t> </a:t>
+            </a:r>
+            <a:r>
+              <a:rPr lang="en-US" dirty="0" err="1"/>
+              <a:t>hoá</a:t>
+            </a:r>
+            <a:r>
+              <a:rPr lang="en-US" dirty="0"/>
+              <a:t> </a:t>
+            </a:r>
+            <a:r>
+              <a:rPr lang="en-US" dirty="0" err="1"/>
+              <a:t>đơn</a:t>
+            </a:r>
+            <a:endParaRPr lang="en-US" dirty="0"/>
+          </a:p>
+        </p:txBody>
+      </p:sp>
+      <p:pic>
+        <p:nvPicPr>
+          <p:cNvPr id="12" name="Picture 11">
+            <a:extLst>
+              <a:ext uri="{FF2B5EF4-FFF2-40B4-BE49-F238E27FC236}">
+                <a16:creationId xmlns:a16="http://schemas.microsoft.com/office/drawing/2014/main" id="{DD14CA78-28FF-A647-90EF-D1FB40323C24}"/>
+              </a:ext>
+            </a:extLst>
+          </p:cNvPr>
+          <p:cNvPicPr>
+            <a:picLocks noChangeAspect="1"/>
+          </p:cNvPicPr>
+          <p:nvPr/>
+        </p:nvPicPr>
+        <p:blipFill>
+          <a:blip r:embed="rId2">
+            <a:extLst>
+              <a:ext uri="{28A0092B-C50C-407E-A947-70E740481C1C}">
+                <a14:useLocalDpi xmlns:a14="http://schemas.microsoft.com/office/drawing/2010/main" val="0"/>
+              </a:ext>
+            </a:extLst>
+          </a:blip>
+          <a:stretch>
+            <a:fillRect/>
+          </a:stretch>
+        </p:blipFill>
+        <p:spPr>
+          <a:xfrm>
+            <a:off x="2243158" y="74177"/>
+            <a:ext cx="7705683" cy="5223380"/>
+          </a:xfrm>
+          <a:prstGeom prst="rect">
+            <a:avLst/>
+          </a:prstGeom>
+        </p:spPr>
+      </p:pic>
+    </p:spTree>
+    <p:extLst>
+      <p:ext uri="{BB962C8B-B14F-4D97-AF65-F5344CB8AC3E}">
+        <p14:creationId xmlns:p14="http://schemas.microsoft.com/office/powerpoint/2010/main" val="600872247"/>
+      </p:ext>
+    </p:extLst>
+  </p:cSld>
+  <p:clrMapOvr>
+    <a:masterClrMapping/>
+  </p:clrMapOvr>
+</p:sld>
+</file>
+
+<file path=ppt/slides/slide23.xml><?xml version="1.0" encoding="utf-8"?>
+<p:sld xmlns:a="http://schemas.openxmlformats.org/drawingml/2006/main" xmlns:r="http://schemas.openxmlformats.org/officeDocument/2006/relationships" xmlns:p="http://schemas.openxmlformats.org/presentationml/2006/main">
+  <p:cSld>
+    <p:spTree>
+      <p:nvGrpSpPr>
+        <p:cNvPr id="1" name=""/>
+        <p:cNvGrpSpPr/>
+        <p:nvPr/>
+      </p:nvGrpSpPr>
+      <p:grpSpPr>
+        <a:xfrm>
+          <a:off x="0" y="0"/>
+          <a:ext cx="0" cy="0"/>
+          <a:chOff x="0" y="0"/>
+          <a:chExt cx="0" cy="0"/>
+        </a:xfrm>
+      </p:grpSpPr>
+      <p:sp>
+        <p:nvSpPr>
+          <p:cNvPr id="2" name="Text Placeholder 1">
+            <a:extLst>
+              <a:ext uri="{FF2B5EF4-FFF2-40B4-BE49-F238E27FC236}">
+                <a16:creationId xmlns:a16="http://schemas.microsoft.com/office/drawing/2014/main" id="{FDBFBBDA-9306-436C-9B9C-68209CB6AD3B}"/>
+              </a:ext>
+            </a:extLst>
+          </p:cNvPr>
+          <p:cNvSpPr>
+            <a:spLocks noGrp="1"/>
+          </p:cNvSpPr>
+          <p:nvPr>
+            <p:ph type="body" sz="quarter" idx="10"/>
+          </p:nvPr>
+        </p:nvSpPr>
+        <p:spPr/>
+        <p:txBody>
+          <a:bodyPr/>
+          <a:lstStyle/>
+          <a:p>
+            <a:r>
+              <a:rPr lang="en-US" dirty="0" err="1"/>
+              <a:t>Biểu</a:t>
+            </a:r>
+            <a:r>
+              <a:rPr lang="en-US" dirty="0"/>
+              <a:t> </a:t>
+            </a:r>
+            <a:r>
               <a:rPr lang="en-US" dirty="0" err="1"/>
               <a:t>đồ</a:t>
             </a:r>
@@ -14741,7 +15085,7 @@
 </p:sld>
 </file>
 
-<file path=ppt/slides/slide22.xml><?xml version="1.0" encoding="utf-8"?>
+<file path=ppt/slides/slide24.xml><?xml version="1.0" encoding="utf-8"?>
 <p:sld xmlns:a="http://schemas.openxmlformats.org/drawingml/2006/main" xmlns:r="http://schemas.openxmlformats.org/officeDocument/2006/relationships" xmlns:p="http://schemas.openxmlformats.org/presentationml/2006/main">
   <p:cSld>
     <p:spTree>
@@ -14917,7 +15261,7 @@
 </p:sld>
 </file>
 
-<file path=ppt/slides/slide23.xml><?xml version="1.0" encoding="utf-8"?>
+<file path=ppt/slides/slide25.xml><?xml version="1.0" encoding="utf-8"?>
 <p:sld xmlns:a="http://schemas.openxmlformats.org/drawingml/2006/main" xmlns:r="http://schemas.openxmlformats.org/officeDocument/2006/relationships" xmlns:p="http://schemas.openxmlformats.org/presentationml/2006/main">
   <p:cSld>
     <p:spTree>
@@ -15101,7 +15445,7 @@
 </p:sld>
 </file>
 
-<file path=ppt/slides/slide24.xml><?xml version="1.0" encoding="utf-8"?>
+<file path=ppt/slides/slide26.xml><?xml version="1.0" encoding="utf-8"?>
 <p:sld xmlns:a="http://schemas.openxmlformats.org/drawingml/2006/main" xmlns:r="http://schemas.openxmlformats.org/officeDocument/2006/relationships" xmlns:p="http://schemas.openxmlformats.org/presentationml/2006/main">
   <p:cSld>
     <p:spTree>
@@ -15279,7 +15623,7 @@
 </p:sld>
 </file>
 
-<file path=ppt/slides/slide25.xml><?xml version="1.0" encoding="utf-8"?>
+<file path=ppt/slides/slide27.xml><?xml version="1.0" encoding="utf-8"?>
 <p:sld xmlns:a="http://schemas.openxmlformats.org/drawingml/2006/main" xmlns:r="http://schemas.openxmlformats.org/officeDocument/2006/relationships" xmlns:p="http://schemas.openxmlformats.org/presentationml/2006/main">
   <p:cSld>
     <p:spTree>
@@ -16377,7 +16721,7 @@
 </p:sld>
 </file>
 
-<file path=ppt/slides/slide26.xml><?xml version="1.0" encoding="utf-8"?>
+<file path=ppt/slides/slide28.xml><?xml version="1.0" encoding="utf-8"?>
 <p:sld xmlns:a="http://schemas.openxmlformats.org/drawingml/2006/main" xmlns:r="http://schemas.openxmlformats.org/officeDocument/2006/relationships" xmlns:p="http://schemas.openxmlformats.org/presentationml/2006/main">
   <p:cSld>
     <p:spTree>
@@ -17479,7 +17823,7 @@
 </p:sld>
 </file>
 
-<file path=ppt/slides/slide27.xml><?xml version="1.0" encoding="utf-8"?>
+<file path=ppt/slides/slide29.xml><?xml version="1.0" encoding="utf-8"?>
 <p:sld xmlns:a="http://schemas.openxmlformats.org/drawingml/2006/main" xmlns:r="http://schemas.openxmlformats.org/officeDocument/2006/relationships" xmlns:p="http://schemas.openxmlformats.org/presentationml/2006/main">
   <p:cSld>
     <p:spTree>

</xml_diff>